<commit_message>
Updated Power and Efficiency Slides
</commit_message>
<xml_diff>
--- a/Lecture Slides/VideoLectureSlides/10.2.pptx
+++ b/Lecture Slides/VideoLectureSlides/10.2.pptx
@@ -5,21 +5,20 @@
     <p:sldMasterId id="2147483660" r:id="rId4"/>
   </p:sldMasterIdLst>
   <p:notesMasterIdLst>
-    <p:notesMasterId r:id="rId17"/>
+    <p:notesMasterId r:id="rId16"/>
   </p:notesMasterIdLst>
   <p:sldIdLst>
     <p:sldId id="256" r:id="rId5"/>
     <p:sldId id="297" r:id="rId6"/>
     <p:sldId id="298" r:id="rId7"/>
     <p:sldId id="299" r:id="rId8"/>
-    <p:sldId id="259" r:id="rId9"/>
-    <p:sldId id="301" r:id="rId10"/>
+    <p:sldId id="301" r:id="rId9"/>
+    <p:sldId id="259" r:id="rId10"/>
     <p:sldId id="268" r:id="rId11"/>
-    <p:sldId id="263" r:id="rId12"/>
-    <p:sldId id="287" r:id="rId13"/>
-    <p:sldId id="261" r:id="rId14"/>
-    <p:sldId id="262" r:id="rId15"/>
-    <p:sldId id="302" r:id="rId16"/>
+    <p:sldId id="287" r:id="rId12"/>
+    <p:sldId id="261" r:id="rId13"/>
+    <p:sldId id="262" r:id="rId14"/>
+    <p:sldId id="302" r:id="rId15"/>
   </p:sldIdLst>
   <p:sldSz cx="9144000" cy="6858000" type="screen4x3"/>
   <p:notesSz cx="6858000" cy="9144000"/>
@@ -233,7 +232,7 @@
           <a:p>
             <a:fld id="{1AA1AB63-216F-4D5B-8811-CCB935E98D4A}" type="datetimeFigureOut">
               <a:rPr lang="en-US" smtClean="0"/>
-              <a:t>12/30/2020</a:t>
+              <a:t>8/2/2021</a:t>
             </a:fld>
             <a:endParaRPr lang="en-US" dirty="0"/>
           </a:p>
@@ -3683,7 +3682,7 @@
           <a:p>
             <a:r>
               <a:rPr lang="en-US" dirty="0"/>
-              <a:t>Power and Efficiency in Particles</a:t>
+              <a:t>Power in Particle Systems</a:t>
             </a:r>
           </a:p>
         </p:txBody>
@@ -3771,153 +3770,6 @@
           <a:p>
             <a:r>
               <a:rPr lang="en-US" dirty="0"/>
-              <a:t>Power Worked Example</a:t>
-            </a:r>
-          </a:p>
-        </p:txBody>
-      </p:sp>
-      <p:sp>
-        <p:nvSpPr>
-          <p:cNvPr id="3" name="Content Placeholder 2"/>
-          <p:cNvSpPr>
-            <a:spLocks noGrp="1"/>
-          </p:cNvSpPr>
-          <p:nvPr>
-            <p:ph idx="1"/>
-          </p:nvPr>
-        </p:nvSpPr>
-        <p:spPr>
-          <a:xfrm>
-            <a:off x="457200" y="1600201"/>
-            <a:ext cx="8229600" cy="1981200"/>
-          </a:xfrm>
-        </p:spPr>
-        <p:txBody>
-          <a:bodyPr/>
-          <a:lstStyle/>
-          <a:p>
-            <a:r>
-              <a:rPr lang="en-US" dirty="0"/>
-              <a:t>If a car delivers an average 100 hp to the road and weighs a total of 1.2 tons, how long will it take to go from 0-60 mph?</a:t>
-            </a:r>
-          </a:p>
-        </p:txBody>
-      </p:sp>
-      <p:sp>
-        <p:nvSpPr>
-          <p:cNvPr id="4" name="Slide Number Placeholder 3"/>
-          <p:cNvSpPr>
-            <a:spLocks noGrp="1"/>
-          </p:cNvSpPr>
-          <p:nvPr>
-            <p:ph type="sldNum" sz="quarter" idx="12"/>
-          </p:nvPr>
-        </p:nvSpPr>
-        <p:spPr/>
-        <p:txBody>
-          <a:bodyPr/>
-          <a:lstStyle/>
-          <a:p>
-            <a:fld id="{929262FE-7F58-4A1E-8AF3-5A510A86DEBD}" type="slidenum">
-              <a:rPr lang="en-US" smtClean="0"/>
-              <a:t>10</a:t>
-            </a:fld>
-            <a:endParaRPr lang="en-US"/>
-          </a:p>
-        </p:txBody>
-      </p:sp>
-      <p:pic>
-        <p:nvPicPr>
-          <p:cNvPr id="1026" name="Picture 2" descr="Road, Car, Motion, Vehicle, Auto, Car On Road, Car Road">
-            <a:extLst>
-              <a:ext uri="{FF2B5EF4-FFF2-40B4-BE49-F238E27FC236}">
-                <a16:creationId xmlns:a16="http://schemas.microsoft.com/office/drawing/2014/main" id="{DE1368F6-B63C-4F90-AE20-8EDAF9984C40}"/>
-              </a:ext>
-            </a:extLst>
-          </p:cNvPr>
-          <p:cNvPicPr>
-            <a:picLocks noChangeAspect="1" noChangeArrowheads="1"/>
-          </p:cNvPicPr>
-          <p:nvPr/>
-        </p:nvPicPr>
-        <p:blipFill rotWithShape="1">
-          <a:blip r:embed="rId2">
-            <a:extLst>
-              <a:ext uri="{28A0092B-C50C-407E-A947-70E740481C1C}">
-                <a14:useLocalDpi xmlns:a14="http://schemas.microsoft.com/office/drawing/2010/main" val="0"/>
-              </a:ext>
-            </a:extLst>
-          </a:blip>
-          <a:srcRect t="18881" r="23333" b="17585"/>
-          <a:stretch/>
-        </p:blipFill>
-        <p:spPr bwMode="auto">
-          <a:xfrm>
-            <a:off x="1828800" y="3763964"/>
-            <a:ext cx="5486400" cy="2922104"/>
-          </a:xfrm>
-          <a:prstGeom prst="rect">
-            <a:avLst/>
-          </a:prstGeom>
-          <a:noFill/>
-          <a:extLst>
-            <a:ext uri="{909E8E84-426E-40DD-AFC4-6F175D3DCCD1}">
-              <a14:hiddenFill xmlns:a14="http://schemas.microsoft.com/office/drawing/2010/main">
-                <a:solidFill>
-                  <a:srgbClr val="FFFFFF"/>
-                </a:solidFill>
-              </a14:hiddenFill>
-            </a:ext>
-          </a:extLst>
-        </p:spPr>
-      </p:pic>
-    </p:spTree>
-    <p:extLst>
-      <p:ext uri="{BB962C8B-B14F-4D97-AF65-F5344CB8AC3E}">
-        <p14:creationId xmlns:p14="http://schemas.microsoft.com/office/powerpoint/2010/main" val="3439906407"/>
-      </p:ext>
-    </p:extLst>
-  </p:cSld>
-  <p:clrMapOvr>
-    <a:masterClrMapping/>
-  </p:clrMapOvr>
-</p:sld>
-</file>
-
-<file path=ppt/slides/slide11.xml><?xml version="1.0" encoding="utf-8"?>
-<p:sld xmlns:a="http://schemas.openxmlformats.org/drawingml/2006/main" xmlns:r="http://schemas.openxmlformats.org/officeDocument/2006/relationships" xmlns:p="http://schemas.openxmlformats.org/presentationml/2006/main">
-  <p:cSld>
-    <p:spTree>
-      <p:nvGrpSpPr>
-        <p:cNvPr id="1" name=""/>
-        <p:cNvGrpSpPr/>
-        <p:nvPr/>
-      </p:nvGrpSpPr>
-      <p:grpSpPr>
-        <a:xfrm>
-          <a:off x="0" y="0"/>
-          <a:ext cx="0" cy="0"/>
-          <a:chOff x="0" y="0"/>
-          <a:chExt cx="0" cy="0"/>
-        </a:xfrm>
-      </p:grpSpPr>
-      <p:sp>
-        <p:nvSpPr>
-          <p:cNvPr id="2" name="Title 1"/>
-          <p:cNvSpPr>
-            <a:spLocks noGrp="1"/>
-          </p:cNvSpPr>
-          <p:nvPr>
-            <p:ph type="title"/>
-          </p:nvPr>
-        </p:nvSpPr>
-        <p:spPr/>
-        <p:txBody>
-          <a:bodyPr/>
-          <a:lstStyle/>
-          <a:p>
-            <a:r>
-              <a:rPr lang="en-US" dirty="0"/>
               <a:t>Power Practice Problem</a:t>
             </a:r>
           </a:p>
@@ -3969,7 +3821,7 @@
           <a:p>
             <a:fld id="{929262FE-7F58-4A1E-8AF3-5A510A86DEBD}" type="slidenum">
               <a:rPr lang="en-US" smtClean="0"/>
-              <a:t>11</a:t>
+              <a:t>10</a:t>
             </a:fld>
             <a:endParaRPr lang="en-US"/>
           </a:p>
@@ -4033,7 +3885,7 @@
 </p:sld>
 </file>
 
-<file path=ppt/slides/slide12.xml><?xml version="1.0" encoding="utf-8"?>
+<file path=ppt/slides/slide11.xml><?xml version="1.0" encoding="utf-8"?>
 <p:sld xmlns:a="http://schemas.openxmlformats.org/drawingml/2006/main" xmlns:r="http://schemas.openxmlformats.org/officeDocument/2006/relationships" xmlns:p="http://schemas.openxmlformats.org/presentationml/2006/main">
   <p:cSld>
     <p:spTree>
@@ -4417,7 +4269,7 @@
           <a:p>
             <a:fld id="{929262FE-7F58-4A1E-8AF3-5A510A86DEBD}" type="slidenum">
               <a:rPr lang="en-US" smtClean="0"/>
-              <a:t>12</a:t>
+              <a:t>11</a:t>
             </a:fld>
             <a:endParaRPr lang="en-US"/>
           </a:p>
@@ -4522,8 +4374,8 @@
           </a:p>
         </p:txBody>
       </p:sp>
-      <mc:AlternateContent xmlns:mc="http://schemas.openxmlformats.org/markup-compatibility/2006">
-        <mc:Choice xmlns:a14="http://schemas.microsoft.com/office/drawing/2010/main" Requires="a14">
+      <mc:AlternateContent xmlns:mc="http://schemas.openxmlformats.org/markup-compatibility/2006" xmlns:a14="http://schemas.microsoft.com/office/drawing/2010/main">
+        <mc:Choice Requires="a14">
           <p:sp>
             <p:nvSpPr>
               <p:cNvPr id="3" name="Content Placeholder 2">
@@ -4562,7 +4414,15 @@
                 <a:pPr lvl="1"/>
                 <a:r>
                   <a:rPr lang="en-US" dirty="0"/>
-                  <a:t>Because of the conservation of energy relationship, this is equal to the rate at which energy is changing.</a:t>
+                  <a:t>Because of the conservation of energy relationship, this is equal to the </a:t>
+                </a:r>
+                <a:r>
+                  <a:rPr lang="en-US" b="1" dirty="0"/>
+                  <a:t>rate at which energy is changing</a:t>
+                </a:r>
+                <a:r>
+                  <a:rPr lang="en-US" dirty="0"/>
+                  <a:t>.</a:t>
                 </a:r>
               </a:p>
               <a:p>
@@ -4678,7 +4538,7 @@
             </p:txBody>
           </p:sp>
         </mc:Choice>
-        <mc:Fallback>
+        <mc:Fallback xmlns="">
           <p:sp>
             <p:nvSpPr>
               <p:cNvPr id="3" name="Content Placeholder 2">
@@ -4779,33 +4639,15 @@
                                   </p:childTnLst>
                                 </p:cTn>
                               </p:par>
-                            </p:childTnLst>
-                          </p:cTn>
-                        </p:par>
-                      </p:childTnLst>
-                    </p:cTn>
-                  </p:par>
-                  <p:par>
-                    <p:cTn id="7" fill="hold">
-                      <p:stCondLst>
-                        <p:cond delay="indefinite"/>
-                      </p:stCondLst>
-                      <p:childTnLst>
-                        <p:par>
-                          <p:cTn id="8" fill="hold">
-                            <p:stCondLst>
-                              <p:cond delay="0"/>
-                            </p:stCondLst>
-                            <p:childTnLst>
                               <p:par>
-                                <p:cTn id="9" presetID="1" presetClass="entr" presetSubtype="0" fill="hold" grpId="0" nodeType="clickEffect">
+                                <p:cTn id="7" presetID="1" presetClass="entr" presetSubtype="0" fill="hold" grpId="0" nodeType="withEffect">
                                   <p:stCondLst>
                                     <p:cond delay="0"/>
                                   </p:stCondLst>
                                   <p:childTnLst>
                                     <p:set>
                                       <p:cBhvr>
-                                        <p:cTn id="10" dur="1" fill="hold">
+                                        <p:cTn id="8" dur="1" fill="hold">
                                           <p:stCondLst>
                                             <p:cond delay="0"/>
                                           </p:stCondLst>
@@ -4835,26 +4677,26 @@
                     </p:cTn>
                   </p:par>
                   <p:par>
-                    <p:cTn id="11" fill="hold">
+                    <p:cTn id="9" fill="hold">
                       <p:stCondLst>
                         <p:cond delay="indefinite"/>
                       </p:stCondLst>
                       <p:childTnLst>
                         <p:par>
-                          <p:cTn id="12" fill="hold">
+                          <p:cTn id="10" fill="hold">
                             <p:stCondLst>
                               <p:cond delay="0"/>
                             </p:stCondLst>
                             <p:childTnLst>
                               <p:par>
-                                <p:cTn id="13" presetID="1" presetClass="entr" presetSubtype="0" fill="hold" grpId="0" nodeType="clickEffect">
+                                <p:cTn id="11" presetID="1" presetClass="entr" presetSubtype="0" fill="hold" grpId="0" nodeType="clickEffect">
                                   <p:stCondLst>
                                     <p:cond delay="0"/>
                                   </p:stCondLst>
                                   <p:childTnLst>
                                     <p:set>
                                       <p:cBhvr>
-                                        <p:cTn id="14" dur="1" fill="hold">
+                                        <p:cTn id="12" dur="1" fill="hold">
                                           <p:stCondLst>
                                             <p:cond delay="0"/>
                                           </p:stCondLst>
@@ -4884,26 +4726,26 @@
                     </p:cTn>
                   </p:par>
                   <p:par>
-                    <p:cTn id="15" fill="hold">
+                    <p:cTn id="13" fill="hold">
                       <p:stCondLst>
                         <p:cond delay="indefinite"/>
                       </p:stCondLst>
                       <p:childTnLst>
                         <p:par>
-                          <p:cTn id="16" fill="hold">
+                          <p:cTn id="14" fill="hold">
                             <p:stCondLst>
                               <p:cond delay="0"/>
                             </p:stCondLst>
                             <p:childTnLst>
                               <p:par>
-                                <p:cTn id="17" presetID="1" presetClass="entr" presetSubtype="0" fill="hold" grpId="0" nodeType="clickEffect">
+                                <p:cTn id="15" presetID="1" presetClass="entr" presetSubtype="0" fill="hold" grpId="0" nodeType="clickEffect">
                                   <p:stCondLst>
                                     <p:cond delay="0"/>
                                   </p:stCondLst>
                                   <p:childTnLst>
                                     <p:set>
                                       <p:cBhvr>
-                                        <p:cTn id="18" dur="1" fill="hold">
+                                        <p:cTn id="16" dur="1" fill="hold">
                                           <p:stCondLst>
                                             <p:cond delay="0"/>
                                           </p:stCondLst>
@@ -5955,14 +5797,655 @@
         </p:nvSpPr>
         <p:spPr/>
         <p:txBody>
+          <a:bodyPr/>
+          <a:lstStyle/>
+          <a:p>
+            <a:r>
+              <a:rPr lang="en-US" dirty="0"/>
+              <a:t>Power Units</a:t>
+            </a:r>
+          </a:p>
+        </p:txBody>
+      </p:sp>
+      <mc:AlternateContent xmlns:mc="http://schemas.openxmlformats.org/markup-compatibility/2006" xmlns:a14="http://schemas.microsoft.com/office/drawing/2010/main">
+        <mc:Choice Requires="a14">
+          <p:sp>
+            <p:nvSpPr>
+              <p:cNvPr id="3" name="Content Placeholder 2"/>
+              <p:cNvSpPr>
+                <a:spLocks noGrp="1"/>
+              </p:cNvSpPr>
+              <p:nvPr>
+                <p:ph idx="1"/>
+              </p:nvPr>
+            </p:nvSpPr>
+            <p:spPr/>
+            <p:txBody>
+              <a:bodyPr/>
+              <a:lstStyle/>
+              <a:p>
+                <a:r>
+                  <a:rPr lang="en-US" dirty="0"/>
+                  <a:t>The units of power generally are a unit force times a unit distance per unit time.</a:t>
+                </a:r>
+              </a:p>
+              <a:p>
+                <a:r>
+                  <a:rPr lang="en-US" dirty="0"/>
+                  <a:t>In the metric system...</a:t>
+                </a:r>
+              </a:p>
+              <a:p>
+                <a:pPr marL="457200" lvl="1" indent="0">
+                  <a:buNone/>
+                </a:pPr>
+                <a14:m>
+                  <m:oMathPara xmlns:m="http://schemas.openxmlformats.org/officeDocument/2006/math">
+                    <m:oMathParaPr>
+                      <m:jc m:val="centerGroup"/>
+                    </m:oMathParaPr>
+                    <m:oMath xmlns:m="http://schemas.openxmlformats.org/officeDocument/2006/math">
+                      <m:r>
+                        <a:rPr lang="en-US" b="0" i="1" smtClean="0">
+                          <a:latin typeface="Cambria Math"/>
+                        </a:rPr>
+                        <m:t>𝑊𝑎𝑡𝑡</m:t>
+                      </m:r>
+                      <m:r>
+                        <a:rPr lang="en-US" b="0" i="1" smtClean="0">
+                          <a:latin typeface="Cambria Math"/>
+                        </a:rPr>
+                        <m:t>=</m:t>
+                      </m:r>
+                      <m:r>
+                        <a:rPr lang="en-US" b="0" i="1" smtClean="0">
+                          <a:latin typeface="Cambria Math"/>
+                        </a:rPr>
+                        <m:t>𝑊</m:t>
+                      </m:r>
+                      <m:r>
+                        <a:rPr lang="en-US" b="0" i="1" smtClean="0">
+                          <a:latin typeface="Cambria Math"/>
+                        </a:rPr>
+                        <m:t>=1</m:t>
+                      </m:r>
+                      <m:f>
+                        <m:fPr>
+                          <m:ctrlPr>
+                            <a:rPr lang="en-US" b="0" i="1" smtClean="0">
+                              <a:latin typeface="Cambria Math" panose="02040503050406030204" pitchFamily="18" charset="0"/>
+                            </a:rPr>
+                          </m:ctrlPr>
+                        </m:fPr>
+                        <m:num>
+                          <m:r>
+                            <a:rPr lang="en-US" b="0" i="1" smtClean="0">
+                              <a:latin typeface="Cambria Math"/>
+                            </a:rPr>
+                            <m:t>𝐽</m:t>
+                          </m:r>
+                        </m:num>
+                        <m:den>
+                          <m:r>
+                            <a:rPr lang="en-US" b="0" i="1" smtClean="0">
+                              <a:latin typeface="Cambria Math"/>
+                            </a:rPr>
+                            <m:t>𝑠</m:t>
+                          </m:r>
+                        </m:den>
+                      </m:f>
+                      <m:r>
+                        <a:rPr lang="en-US" b="0" i="1" smtClean="0">
+                          <a:latin typeface="Cambria Math"/>
+                        </a:rPr>
+                        <m:t>=1</m:t>
+                      </m:r>
+                      <m:f>
+                        <m:fPr>
+                          <m:ctrlPr>
+                            <a:rPr lang="en-US" b="0" i="1" smtClean="0">
+                              <a:latin typeface="Cambria Math" panose="02040503050406030204" pitchFamily="18" charset="0"/>
+                            </a:rPr>
+                          </m:ctrlPr>
+                        </m:fPr>
+                        <m:num>
+                          <m:r>
+                            <a:rPr lang="en-US" b="0" i="1" smtClean="0">
+                              <a:latin typeface="Cambria Math"/>
+                            </a:rPr>
+                            <m:t>𝑁𝑚</m:t>
+                          </m:r>
+                        </m:num>
+                        <m:den>
+                          <m:r>
+                            <a:rPr lang="en-US" b="0" i="1" smtClean="0">
+                              <a:latin typeface="Cambria Math"/>
+                            </a:rPr>
+                            <m:t>𝑠</m:t>
+                          </m:r>
+                        </m:den>
+                      </m:f>
+                    </m:oMath>
+                  </m:oMathPara>
+                </a14:m>
+                <a:endParaRPr lang="en-US" dirty="0"/>
+              </a:p>
+              <a:p>
+                <a:r>
+                  <a:rPr lang="en-US" dirty="0"/>
+                  <a:t>In the US Customary system...</a:t>
+                </a:r>
+              </a:p>
+              <a:p>
+                <a:pPr marL="457200" lvl="1" indent="0">
+                  <a:buNone/>
+                </a:pPr>
+                <a14:m>
+                  <m:oMathPara xmlns:m="http://schemas.openxmlformats.org/officeDocument/2006/math">
+                    <m:oMathParaPr>
+                      <m:jc m:val="centerGroup"/>
+                    </m:oMathParaPr>
+                    <m:oMath xmlns:m="http://schemas.openxmlformats.org/officeDocument/2006/math">
+                      <m:r>
+                        <a:rPr lang="en-US" b="0" i="1" smtClean="0">
+                          <a:latin typeface="Cambria Math"/>
+                        </a:rPr>
+                        <m:t>𝐻𝑜𝑟𝑠𝑒𝑝𝑜𝑤𝑒𝑟</m:t>
+                      </m:r>
+                      <m:r>
+                        <a:rPr lang="en-US" i="1">
+                          <a:latin typeface="Cambria Math"/>
+                        </a:rPr>
+                        <m:t>=</m:t>
+                      </m:r>
+                      <m:r>
+                        <a:rPr lang="en-US" b="0" i="1" smtClean="0">
+                          <a:latin typeface="Cambria Math"/>
+                        </a:rPr>
+                        <m:t>h𝑝</m:t>
+                      </m:r>
+                      <m:r>
+                        <a:rPr lang="en-US" i="1">
+                          <a:latin typeface="Cambria Math"/>
+                        </a:rPr>
+                        <m:t>=</m:t>
+                      </m:r>
+                      <m:r>
+                        <a:rPr lang="en-US" b="0" i="1" smtClean="0">
+                          <a:latin typeface="Cambria Math"/>
+                        </a:rPr>
+                        <m:t>550</m:t>
+                      </m:r>
+                      <m:f>
+                        <m:fPr>
+                          <m:ctrlPr>
+                            <a:rPr lang="en-US" i="1">
+                              <a:latin typeface="Cambria Math" panose="02040503050406030204" pitchFamily="18" charset="0"/>
+                            </a:rPr>
+                          </m:ctrlPr>
+                        </m:fPr>
+                        <m:num>
+                          <m:r>
+                            <a:rPr lang="en-US" b="0" i="1" smtClean="0">
+                              <a:latin typeface="Cambria Math"/>
+                            </a:rPr>
+                            <m:t>𝑓𝑡</m:t>
+                          </m:r>
+                          <m:r>
+                            <a:rPr lang="en-US" b="0" i="1" smtClean="0">
+                              <a:latin typeface="Cambria Math"/>
+                            </a:rPr>
+                            <m:t> </m:t>
+                          </m:r>
+                          <m:r>
+                            <a:rPr lang="en-US" b="0" i="1" smtClean="0">
+                              <a:latin typeface="Cambria Math"/>
+                            </a:rPr>
+                            <m:t>𝑙𝑏</m:t>
+                          </m:r>
+                        </m:num>
+                        <m:den>
+                          <m:r>
+                            <a:rPr lang="en-US" i="1">
+                              <a:latin typeface="Cambria Math"/>
+                            </a:rPr>
+                            <m:t>𝑠</m:t>
+                          </m:r>
+                        </m:den>
+                      </m:f>
+                    </m:oMath>
+                  </m:oMathPara>
+                </a14:m>
+                <a:endParaRPr lang="en-US" dirty="0"/>
+              </a:p>
+              <a:p>
+                <a:pPr marL="457200" lvl="1" indent="0">
+                  <a:buNone/>
+                </a:pPr>
+                <a:endParaRPr lang="en-US" dirty="0"/>
+              </a:p>
+              <a:p>
+                <a:pPr marL="457200" lvl="1" indent="0">
+                  <a:buNone/>
+                </a:pPr>
+                <a:endParaRPr lang="en-US" dirty="0"/>
+              </a:p>
+            </p:txBody>
+          </p:sp>
+        </mc:Choice>
+        <mc:Fallback xmlns="">
+          <p:sp>
+            <p:nvSpPr>
+              <p:cNvPr id="3" name="Content Placeholder 2"/>
+              <p:cNvSpPr>
+                <a:spLocks noGrp="1" noRot="1" noChangeAspect="1" noMove="1" noResize="1" noEditPoints="1" noAdjustHandles="1" noChangeArrowheads="1" noChangeShapeType="1" noTextEdit="1"/>
+              </p:cNvSpPr>
+              <p:nvPr>
+                <p:ph idx="1"/>
+              </p:nvPr>
+            </p:nvSpPr>
+            <p:spPr>
+              <a:blipFill>
+                <a:blip r:embed="rId2"/>
+                <a:stretch>
+                  <a:fillRect l="-1704" t="-1752"/>
+                </a:stretch>
+              </a:blipFill>
+            </p:spPr>
+            <p:txBody>
+              <a:bodyPr/>
+              <a:lstStyle/>
+              <a:p>
+                <a:r>
+                  <a:rPr lang="en-US">
+                    <a:noFill/>
+                  </a:rPr>
+                  <a:t> </a:t>
+                </a:r>
+              </a:p>
+            </p:txBody>
+          </p:sp>
+        </mc:Fallback>
+      </mc:AlternateContent>
+      <p:sp>
+        <p:nvSpPr>
+          <p:cNvPr id="4" name="Slide Number Placeholder 3"/>
+          <p:cNvSpPr>
+            <a:spLocks noGrp="1"/>
+          </p:cNvSpPr>
+          <p:nvPr>
+            <p:ph type="sldNum" sz="quarter" idx="12"/>
+          </p:nvPr>
+        </p:nvSpPr>
+        <p:spPr/>
+        <p:txBody>
+          <a:bodyPr/>
+          <a:lstStyle/>
+          <a:p>
+            <a:pPr marL="0" marR="0" lvl="0" indent="0" algn="r" defTabSz="914400" rtl="0" eaLnBrk="1" fontAlgn="auto" latinLnBrk="0" hangingPunct="1">
+              <a:lnSpc>
+                <a:spcPct val="100000"/>
+              </a:lnSpc>
+              <a:spcBef>
+                <a:spcPts val="0"/>
+              </a:spcBef>
+              <a:spcAft>
+                <a:spcPts val="0"/>
+              </a:spcAft>
+              <a:buClrTx/>
+              <a:buSzTx/>
+              <a:buFontTx/>
+              <a:buNone/>
+              <a:tabLst/>
+              <a:defRPr/>
+            </a:pPr>
+            <a:fld id="{929262FE-7F58-4A1E-8AF3-5A510A86DEBD}" type="slidenum">
+              <a:rPr kumimoji="0" lang="en-US" sz="1200" b="0" i="0" u="none" strike="noStrike" kern="1200" cap="none" spc="0" normalizeH="0" baseline="0" noProof="0" smtClean="0">
+                <a:ln>
+                  <a:noFill/>
+                </a:ln>
+                <a:solidFill>
+                  <a:srgbClr val="4F81BD">
+                    <a:lumMod val="50000"/>
+                  </a:srgbClr>
+                </a:solidFill>
+                <a:effectLst/>
+                <a:uLnTx/>
+                <a:uFillTx/>
+                <a:latin typeface="Calibri"/>
+                <a:ea typeface="+mn-ea"/>
+                <a:cs typeface="+mn-cs"/>
+              </a:rPr>
+              <a:pPr marL="0" marR="0" lvl="0" indent="0" algn="r" defTabSz="914400" rtl="0" eaLnBrk="1" fontAlgn="auto" latinLnBrk="0" hangingPunct="1">
+                <a:lnSpc>
+                  <a:spcPct val="100000"/>
+                </a:lnSpc>
+                <a:spcBef>
+                  <a:spcPts val="0"/>
+                </a:spcBef>
+                <a:spcAft>
+                  <a:spcPts val="0"/>
+                </a:spcAft>
+                <a:buClrTx/>
+                <a:buSzTx/>
+                <a:buFontTx/>
+                <a:buNone/>
+                <a:tabLst/>
+                <a:defRPr/>
+              </a:pPr>
+              <a:t>5</a:t>
+            </a:fld>
+            <a:endParaRPr kumimoji="0" lang="en-US" sz="1200" b="0" i="0" u="none" strike="noStrike" kern="1200" cap="none" spc="0" normalizeH="0" baseline="0" noProof="0">
+              <a:ln>
+                <a:noFill/>
+              </a:ln>
+              <a:solidFill>
+                <a:srgbClr val="4F81BD">
+                  <a:lumMod val="50000"/>
+                </a:srgbClr>
+              </a:solidFill>
+              <a:effectLst/>
+              <a:uLnTx/>
+              <a:uFillTx/>
+              <a:latin typeface="Calibri"/>
+              <a:ea typeface="+mn-ea"/>
+              <a:cs typeface="+mn-cs"/>
+            </a:endParaRPr>
+          </a:p>
+        </p:txBody>
+      </p:sp>
+    </p:spTree>
+    <p:extLst>
+      <p:ext uri="{BB962C8B-B14F-4D97-AF65-F5344CB8AC3E}">
+        <p14:creationId xmlns:p14="http://schemas.microsoft.com/office/powerpoint/2010/main" val="2594544635"/>
+      </p:ext>
+    </p:extLst>
+  </p:cSld>
+  <p:clrMapOvr>
+    <a:masterClrMapping/>
+  </p:clrMapOvr>
+  <p:timing>
+    <p:tnLst>
+      <p:par>
+        <p:cTn id="1" dur="indefinite" restart="never" nodeType="tmRoot">
+          <p:childTnLst>
+            <p:seq concurrent="1" nextAc="seek">
+              <p:cTn id="2" dur="indefinite" nodeType="mainSeq">
+                <p:childTnLst>
+                  <p:par>
+                    <p:cTn id="3" fill="hold">
+                      <p:stCondLst>
+                        <p:cond delay="indefinite"/>
+                      </p:stCondLst>
+                      <p:childTnLst>
+                        <p:par>
+                          <p:cTn id="4" fill="hold">
+                            <p:stCondLst>
+                              <p:cond delay="0"/>
+                            </p:stCondLst>
+                            <p:childTnLst>
+                              <p:par>
+                                <p:cTn id="5" presetID="1" presetClass="entr" presetSubtype="0" fill="hold" grpId="0" nodeType="clickEffect">
+                                  <p:stCondLst>
+                                    <p:cond delay="0"/>
+                                  </p:stCondLst>
+                                  <p:childTnLst>
+                                    <p:set>
+                                      <p:cBhvr>
+                                        <p:cTn id="6" dur="1" fill="hold">
+                                          <p:stCondLst>
+                                            <p:cond delay="0"/>
+                                          </p:stCondLst>
+                                        </p:cTn>
+                                        <p:tgtEl>
+                                          <p:spTgt spid="3">
+                                            <p:txEl>
+                                              <p:pRg st="0" end="0"/>
+                                            </p:txEl>
+                                          </p:spTgt>
+                                        </p:tgtEl>
+                                        <p:attrNameLst>
+                                          <p:attrName>style.visibility</p:attrName>
+                                        </p:attrNameLst>
+                                      </p:cBhvr>
+                                      <p:to>
+                                        <p:strVal val="visible"/>
+                                      </p:to>
+                                    </p:set>
+                                  </p:childTnLst>
+                                </p:cTn>
+                              </p:par>
+                            </p:childTnLst>
+                          </p:cTn>
+                        </p:par>
+                      </p:childTnLst>
+                    </p:cTn>
+                  </p:par>
+                  <p:par>
+                    <p:cTn id="7" fill="hold">
+                      <p:stCondLst>
+                        <p:cond delay="indefinite"/>
+                      </p:stCondLst>
+                      <p:childTnLst>
+                        <p:par>
+                          <p:cTn id="8" fill="hold">
+                            <p:stCondLst>
+                              <p:cond delay="0"/>
+                            </p:stCondLst>
+                            <p:childTnLst>
+                              <p:par>
+                                <p:cTn id="9" presetID="1" presetClass="entr" presetSubtype="0" fill="hold" grpId="0" nodeType="clickEffect">
+                                  <p:stCondLst>
+                                    <p:cond delay="0"/>
+                                  </p:stCondLst>
+                                  <p:childTnLst>
+                                    <p:set>
+                                      <p:cBhvr>
+                                        <p:cTn id="10" dur="1" fill="hold">
+                                          <p:stCondLst>
+                                            <p:cond delay="0"/>
+                                          </p:stCondLst>
+                                        </p:cTn>
+                                        <p:tgtEl>
+                                          <p:spTgt spid="3">
+                                            <p:txEl>
+                                              <p:pRg st="1" end="1"/>
+                                            </p:txEl>
+                                          </p:spTgt>
+                                        </p:tgtEl>
+                                        <p:attrNameLst>
+                                          <p:attrName>style.visibility</p:attrName>
+                                        </p:attrNameLst>
+                                      </p:cBhvr>
+                                      <p:to>
+                                        <p:strVal val="visible"/>
+                                      </p:to>
+                                    </p:set>
+                                  </p:childTnLst>
+                                </p:cTn>
+                              </p:par>
+                              <p:par>
+                                <p:cTn id="11" presetID="1" presetClass="entr" presetSubtype="0" fill="hold" grpId="0" nodeType="withEffect">
+                                  <p:stCondLst>
+                                    <p:cond delay="0"/>
+                                  </p:stCondLst>
+                                  <p:childTnLst>
+                                    <p:set>
+                                      <p:cBhvr>
+                                        <p:cTn id="12" dur="1" fill="hold">
+                                          <p:stCondLst>
+                                            <p:cond delay="0"/>
+                                          </p:stCondLst>
+                                        </p:cTn>
+                                        <p:tgtEl>
+                                          <p:spTgt spid="3">
+                                            <p:txEl>
+                                              <p:pRg st="2" end="2"/>
+                                            </p:txEl>
+                                          </p:spTgt>
+                                        </p:tgtEl>
+                                        <p:attrNameLst>
+                                          <p:attrName>style.visibility</p:attrName>
+                                        </p:attrNameLst>
+                                      </p:cBhvr>
+                                      <p:to>
+                                        <p:strVal val="visible"/>
+                                      </p:to>
+                                    </p:set>
+                                  </p:childTnLst>
+                                </p:cTn>
+                              </p:par>
+                            </p:childTnLst>
+                          </p:cTn>
+                        </p:par>
+                      </p:childTnLst>
+                    </p:cTn>
+                  </p:par>
+                  <p:par>
+                    <p:cTn id="13" fill="hold">
+                      <p:stCondLst>
+                        <p:cond delay="indefinite"/>
+                      </p:stCondLst>
+                      <p:childTnLst>
+                        <p:par>
+                          <p:cTn id="14" fill="hold">
+                            <p:stCondLst>
+                              <p:cond delay="0"/>
+                            </p:stCondLst>
+                            <p:childTnLst>
+                              <p:par>
+                                <p:cTn id="15" presetID="1" presetClass="entr" presetSubtype="0" fill="hold" grpId="0" nodeType="clickEffect">
+                                  <p:stCondLst>
+                                    <p:cond delay="0"/>
+                                  </p:stCondLst>
+                                  <p:childTnLst>
+                                    <p:set>
+                                      <p:cBhvr>
+                                        <p:cTn id="16" dur="1" fill="hold">
+                                          <p:stCondLst>
+                                            <p:cond delay="0"/>
+                                          </p:stCondLst>
+                                        </p:cTn>
+                                        <p:tgtEl>
+                                          <p:spTgt spid="3">
+                                            <p:txEl>
+                                              <p:pRg st="3" end="3"/>
+                                            </p:txEl>
+                                          </p:spTgt>
+                                        </p:tgtEl>
+                                        <p:attrNameLst>
+                                          <p:attrName>style.visibility</p:attrName>
+                                        </p:attrNameLst>
+                                      </p:cBhvr>
+                                      <p:to>
+                                        <p:strVal val="visible"/>
+                                      </p:to>
+                                    </p:set>
+                                  </p:childTnLst>
+                                </p:cTn>
+                              </p:par>
+                              <p:par>
+                                <p:cTn id="17" presetID="1" presetClass="entr" presetSubtype="0" fill="hold" grpId="0" nodeType="withEffect">
+                                  <p:stCondLst>
+                                    <p:cond delay="0"/>
+                                  </p:stCondLst>
+                                  <p:childTnLst>
+                                    <p:set>
+                                      <p:cBhvr>
+                                        <p:cTn id="18" dur="1" fill="hold">
+                                          <p:stCondLst>
+                                            <p:cond delay="0"/>
+                                          </p:stCondLst>
+                                        </p:cTn>
+                                        <p:tgtEl>
+                                          <p:spTgt spid="3">
+                                            <p:txEl>
+                                              <p:pRg st="4" end="4"/>
+                                            </p:txEl>
+                                          </p:spTgt>
+                                        </p:tgtEl>
+                                        <p:attrNameLst>
+                                          <p:attrName>style.visibility</p:attrName>
+                                        </p:attrNameLst>
+                                      </p:cBhvr>
+                                      <p:to>
+                                        <p:strVal val="visible"/>
+                                      </p:to>
+                                    </p:set>
+                                  </p:childTnLst>
+                                </p:cTn>
+                              </p:par>
+                            </p:childTnLst>
+                          </p:cTn>
+                        </p:par>
+                      </p:childTnLst>
+                    </p:cTn>
+                  </p:par>
+                </p:childTnLst>
+              </p:cTn>
+              <p:prevCondLst>
+                <p:cond evt="onPrev" delay="0">
+                  <p:tgtEl>
+                    <p:sldTgt/>
+                  </p:tgtEl>
+                </p:cond>
+              </p:prevCondLst>
+              <p:nextCondLst>
+                <p:cond evt="onNext" delay="0">
+                  <p:tgtEl>
+                    <p:sldTgt/>
+                  </p:tgtEl>
+                </p:cond>
+              </p:nextCondLst>
+            </p:seq>
+          </p:childTnLst>
+        </p:cTn>
+      </p:par>
+    </p:tnLst>
+    <p:bldLst>
+      <p:bldP spid="3" grpId="0" build="p"/>
+    </p:bldLst>
+  </p:timing>
+</p:sld>
+</file>
+
+<file path=ppt/slides/slide6.xml><?xml version="1.0" encoding="utf-8"?>
+<p:sld xmlns:a="http://schemas.openxmlformats.org/drawingml/2006/main" xmlns:r="http://schemas.openxmlformats.org/officeDocument/2006/relationships" xmlns:p="http://schemas.openxmlformats.org/presentationml/2006/main">
+  <p:cSld>
+    <p:spTree>
+      <p:nvGrpSpPr>
+        <p:cNvPr id="1" name=""/>
+        <p:cNvGrpSpPr/>
+        <p:nvPr/>
+      </p:nvGrpSpPr>
+      <p:grpSpPr>
+        <a:xfrm>
+          <a:off x="0" y="0"/>
+          <a:ext cx="0" cy="0"/>
+          <a:chOff x="0" y="0"/>
+          <a:chExt cx="0" cy="0"/>
+        </a:xfrm>
+      </p:grpSpPr>
+      <p:sp>
+        <p:nvSpPr>
+          <p:cNvPr id="2" name="Title 1"/>
+          <p:cNvSpPr>
+            <a:spLocks noGrp="1"/>
+          </p:cNvSpPr>
+          <p:nvPr>
+            <p:ph type="title"/>
+          </p:nvPr>
+        </p:nvSpPr>
+        <p:spPr/>
+        <p:txBody>
           <a:bodyPr>
-            <a:normAutofit fontScale="90000"/>
+            <a:normAutofit/>
           </a:bodyPr>
           <a:lstStyle/>
           <a:p>
             <a:r>
               <a:rPr lang="en-US" dirty="0"/>
-              <a:t>Power (Translational and Rotational)</a:t>
+              <a:t>Power and Energy Equations</a:t>
             </a:r>
           </a:p>
         </p:txBody>
@@ -6001,13 +6484,34 @@
                       <m:jc m:val="centerGroup"/>
                     </m:oMathParaPr>
                     <m:oMath xmlns:m="http://schemas.openxmlformats.org/officeDocument/2006/math">
-                      <m:r>
-                        <a:rPr lang="en-US" i="1">
-                          <a:latin typeface="Cambria Math"/>
-                          <a:ea typeface="Cambria Math"/>
-                        </a:rPr>
-                        <m:t>𝒫</m:t>
-                      </m:r>
+                      <m:sSub>
+                        <m:sSubPr>
+                          <m:ctrlPr>
+                            <a:rPr lang="en-US" i="1">
+                              <a:latin typeface="Cambria Math" panose="02040503050406030204" pitchFamily="18" charset="0"/>
+                              <a:ea typeface="Cambria Math"/>
+                            </a:rPr>
+                          </m:ctrlPr>
+                        </m:sSubPr>
+                        <m:e>
+                          <m:r>
+                            <a:rPr lang="en-US" b="0" i="1" smtClean="0">
+                              <a:latin typeface="Cambria Math" panose="02040503050406030204" pitchFamily="18" charset="0"/>
+                              <a:ea typeface="Cambria Math"/>
+                            </a:rPr>
+                            <m:t>𝑃</m:t>
+                          </m:r>
+                        </m:e>
+                        <m:sub>
+                          <m:r>
+                            <a:rPr lang="en-US" i="1">
+                              <a:latin typeface="Cambria Math" panose="02040503050406030204" pitchFamily="18" charset="0"/>
+                              <a:ea typeface="Cambria Math"/>
+                            </a:rPr>
+                            <m:t>𝑎𝑣𝑒</m:t>
+                          </m:r>
+                        </m:sub>
+                      </m:sSub>
                       <m:r>
                         <a:rPr lang="en-US" i="1">
                           <a:latin typeface="Cambria Math"/>
@@ -6102,53 +6606,170 @@
                           <a:latin typeface="Cambria Math"/>
                           <a:ea typeface="Cambria Math"/>
                         </a:rPr>
-                        <m:t>=(</m:t>
+                        <m:t>=</m:t>
                       </m:r>
-                      <m:r>
-                        <a:rPr lang="en-US" i="1">
-                          <a:latin typeface="Cambria Math"/>
-                        </a:rPr>
-                        <m:t>𝐹</m:t>
-                      </m:r>
-                      <m:r>
-                        <a:rPr lang="en-US" b="0" i="1" smtClean="0">
-                          <a:latin typeface="Cambria Math"/>
-                        </a:rPr>
-                        <m:t>)</m:t>
-                      </m:r>
-                      <m:r>
-                        <a:rPr lang="en-US" i="1">
-                          <a:latin typeface="Cambria Math"/>
-                        </a:rPr>
-                        <m:t> </m:t>
-                      </m:r>
-                      <m:r>
-                        <a:rPr lang="en-US" b="0" i="1" smtClean="0">
-                          <a:latin typeface="Cambria Math"/>
-                        </a:rPr>
-                        <m:t>(</m:t>
-                      </m:r>
-                      <m:r>
-                        <a:rPr lang="en-US" b="0" i="1" smtClean="0">
-                          <a:latin typeface="Cambria Math"/>
-                        </a:rPr>
-                        <m:t>𝑣</m:t>
-                      </m:r>
-                      <m:r>
-                        <a:rPr lang="en-US" b="0" i="1" smtClean="0">
-                          <a:latin typeface="Cambria Math"/>
-                        </a:rPr>
-                        <m:t>)</m:t>
-                      </m:r>
+                      <m:d>
+                        <m:dPr>
+                          <m:ctrlPr>
+                            <a:rPr lang="en-US" b="0" i="1" smtClean="0">
+                              <a:latin typeface="Cambria Math" panose="02040503050406030204" pitchFamily="18" charset="0"/>
+                              <a:ea typeface="Cambria Math"/>
+                            </a:rPr>
+                          </m:ctrlPr>
+                        </m:dPr>
+                        <m:e>
+                          <m:r>
+                            <a:rPr lang="en-US" i="1">
+                              <a:latin typeface="Cambria Math"/>
+                            </a:rPr>
+                            <m:t>𝐹</m:t>
+                          </m:r>
+                        </m:e>
+                      </m:d>
+                      <m:d>
+                        <m:dPr>
+                          <m:ctrlPr>
+                            <a:rPr lang="en-US" b="0" i="1" smtClean="0">
+                              <a:latin typeface="Cambria Math" panose="02040503050406030204" pitchFamily="18" charset="0"/>
+                            </a:rPr>
+                          </m:ctrlPr>
+                        </m:dPr>
+                        <m:e>
+                          <m:r>
+                            <a:rPr lang="en-US" b="0" i="1" smtClean="0">
+                              <a:latin typeface="Cambria Math"/>
+                            </a:rPr>
+                            <m:t>𝑣</m:t>
+                          </m:r>
+                        </m:e>
+                      </m:d>
                     </m:oMath>
                   </m:oMathPara>
                 </a14:m>
-                <a:endParaRPr lang="en-US" dirty="0"/>
+                <a:endParaRPr lang="en-US" b="0" dirty="0"/>
               </a:p>
               <a:p>
                 <a:r>
                   <a:rPr lang="en-US" dirty="0"/>
-                  <a:t>For a rotational system with no translation...</a:t>
+                  <a:t>We can use power in conjunction with </a:t>
+                </a:r>
+                <a:r>
+                  <a:rPr lang="en-US" b="1" dirty="0"/>
+                  <a:t>work and energy equations</a:t>
+                </a:r>
+                <a:r>
+                  <a:rPr lang="en-US" dirty="0"/>
+                  <a:t>.</a:t>
+                </a:r>
+              </a:p>
+              <a:p>
+                <a:pPr marL="0" indent="0">
+                  <a:buNone/>
+                </a:pPr>
+                <a14:m>
+                  <m:oMathPara xmlns:m="http://schemas.openxmlformats.org/officeDocument/2006/math">
+                    <m:oMathParaPr>
+                      <m:jc m:val="centerGroup"/>
+                    </m:oMathParaPr>
+                    <m:oMath xmlns:m="http://schemas.openxmlformats.org/officeDocument/2006/math">
+                      <m:sSub>
+                        <m:sSubPr>
+                          <m:ctrlPr>
+                            <a:rPr lang="en-US" i="1">
+                              <a:latin typeface="Cambria Math" panose="02040503050406030204" pitchFamily="18" charset="0"/>
+                              <a:ea typeface="Cambria Math"/>
+                            </a:rPr>
+                          </m:ctrlPr>
+                        </m:sSubPr>
+                        <m:e>
+                          <m:r>
+                            <a:rPr lang="en-US" b="0" i="1" smtClean="0">
+                              <a:latin typeface="Cambria Math" panose="02040503050406030204" pitchFamily="18" charset="0"/>
+                              <a:ea typeface="Cambria Math"/>
+                            </a:rPr>
+                            <m:t>𝑃</m:t>
+                          </m:r>
+                        </m:e>
+                        <m:sub>
+                          <m:r>
+                            <a:rPr lang="en-US" i="1">
+                              <a:latin typeface="Cambria Math" panose="02040503050406030204" pitchFamily="18" charset="0"/>
+                              <a:ea typeface="Cambria Math"/>
+                            </a:rPr>
+                            <m:t>𝑎𝑣𝑒</m:t>
+                          </m:r>
+                        </m:sub>
+                      </m:sSub>
+                      <m:r>
+                        <a:rPr lang="en-US" b="0" i="1" smtClean="0">
+                          <a:latin typeface="Cambria Math" panose="02040503050406030204" pitchFamily="18" charset="0"/>
+                          <a:ea typeface="Cambria Math"/>
+                        </a:rPr>
+                        <m:t>=</m:t>
+                      </m:r>
+                      <m:f>
+                        <m:fPr>
+                          <m:ctrlPr>
+                            <a:rPr lang="en-US" b="0" i="1" smtClean="0">
+                              <a:latin typeface="Cambria Math" panose="02040503050406030204" pitchFamily="18" charset="0"/>
+                              <a:ea typeface="Cambria Math"/>
+                            </a:rPr>
+                          </m:ctrlPr>
+                        </m:fPr>
+                        <m:num>
+                          <m:r>
+                            <a:rPr lang="en-US" b="0" i="1" smtClean="0">
+                              <a:latin typeface="Cambria Math" panose="02040503050406030204" pitchFamily="18" charset="0"/>
+                              <a:ea typeface="Cambria Math" panose="02040503050406030204" pitchFamily="18" charset="0"/>
+                            </a:rPr>
+                            <m:t>∆</m:t>
+                          </m:r>
+                          <m:r>
+                            <a:rPr lang="en-US" b="0" i="1" smtClean="0">
+                              <a:latin typeface="Cambria Math" panose="02040503050406030204" pitchFamily="18" charset="0"/>
+                              <a:ea typeface="Cambria Math" panose="02040503050406030204" pitchFamily="18" charset="0"/>
+                            </a:rPr>
+                            <m:t>𝐾𝐸</m:t>
+                          </m:r>
+                          <m:r>
+                            <a:rPr lang="en-US" b="0" i="1" smtClean="0">
+                              <a:latin typeface="Cambria Math" panose="02040503050406030204" pitchFamily="18" charset="0"/>
+                              <a:ea typeface="Cambria Math" panose="02040503050406030204" pitchFamily="18" charset="0"/>
+                            </a:rPr>
+                            <m:t>+∆</m:t>
+                          </m:r>
+                          <m:r>
+                            <a:rPr lang="en-US" b="0" i="1" smtClean="0">
+                              <a:latin typeface="Cambria Math" panose="02040503050406030204" pitchFamily="18" charset="0"/>
+                              <a:ea typeface="Cambria Math" panose="02040503050406030204" pitchFamily="18" charset="0"/>
+                            </a:rPr>
+                            <m:t>𝑃𝐸</m:t>
+                          </m:r>
+                        </m:num>
+                        <m:den>
+                          <m:r>
+                            <a:rPr lang="en-US" b="0" i="1" smtClean="0">
+                              <a:latin typeface="Cambria Math" panose="02040503050406030204" pitchFamily="18" charset="0"/>
+                              <a:ea typeface="Cambria Math"/>
+                            </a:rPr>
+                            <m:t>𝑡</m:t>
+                          </m:r>
+                        </m:den>
+                      </m:f>
+                    </m:oMath>
+                  </m:oMathPara>
+                </a14:m>
+                <a:endParaRPr lang="en-US" b="0" dirty="0">
+                  <a:ea typeface="Cambria Math"/>
+                </a:endParaRPr>
+              </a:p>
+              <a:p>
+                <a:pPr marL="0" indent="0">
+                  <a:buNone/>
+                </a:pPr>
+                <a:r>
+                  <a:rPr lang="en-US" dirty="0"/>
+                  <a:t>	Or…</a:t>
                 </a:r>
               </a:p>
               <a:p>
@@ -6162,267 +6783,81 @@
                     </m:oMathParaPr>
                     <m:oMath xmlns:m="http://schemas.openxmlformats.org/officeDocument/2006/math">
                       <m:r>
-                        <a:rPr lang="en-US" i="1">
-                          <a:latin typeface="Cambria Math"/>
-                          <a:ea typeface="Cambria Math"/>
-                        </a:rPr>
-                        <m:t>𝒫</m:t>
-                      </m:r>
-                      <m:r>
-                        <a:rPr lang="en-US" i="1">
-                          <a:latin typeface="Cambria Math"/>
-                        </a:rPr>
-                        <m:t>= </m:t>
-                      </m:r>
-                      <m:f>
-                        <m:fPr>
-                          <m:ctrlPr>
-                            <a:rPr lang="en-US" i="1">
-                              <a:latin typeface="Cambria Math" panose="02040503050406030204" pitchFamily="18" charset="0"/>
-                            </a:rPr>
-                          </m:ctrlPr>
-                        </m:fPr>
-                        <m:num>
-                          <m:r>
-                            <a:rPr lang="en-US" i="1">
-                              <a:latin typeface="Cambria Math"/>
-                            </a:rPr>
-                            <m:t>𝑊</m:t>
-                          </m:r>
-                        </m:num>
-                        <m:den>
-                          <m:r>
-                            <a:rPr lang="en-US" i="1">
-                              <a:latin typeface="Cambria Math"/>
-                              <a:ea typeface="Cambria Math"/>
-                            </a:rPr>
-                            <m:t>𝑡</m:t>
-                          </m:r>
-                        </m:den>
-                      </m:f>
-                      <m:r>
-                        <a:rPr lang="en-US" i="1">
-                          <a:latin typeface="Cambria Math"/>
-                          <a:ea typeface="Cambria Math"/>
-                        </a:rPr>
-                        <m:t>=</m:t>
-                      </m:r>
-                      <m:f>
-                        <m:fPr>
-                          <m:ctrlPr>
-                            <a:rPr lang="en-US" i="1">
-                              <a:latin typeface="Cambria Math" panose="02040503050406030204" pitchFamily="18" charset="0"/>
-                            </a:rPr>
-                          </m:ctrlPr>
-                        </m:fPr>
-                        <m:num>
-                          <m:r>
-                            <a:rPr lang="en-US" b="0" i="1" smtClean="0">
-                              <a:latin typeface="Cambria Math"/>
-                            </a:rPr>
-                            <m:t>(</m:t>
-                          </m:r>
-                          <m:r>
-                            <a:rPr lang="en-US" b="0" i="1" smtClean="0">
-                              <a:latin typeface="Cambria Math"/>
-                            </a:rPr>
-                            <m:t>𝑀</m:t>
-                          </m:r>
-                          <m:r>
-                            <a:rPr lang="en-US" b="0" i="1" smtClean="0">
-                              <a:latin typeface="Cambria Math"/>
-                            </a:rPr>
-                            <m:t>) (∆</m:t>
-                          </m:r>
-                          <m:r>
-                            <a:rPr lang="en-US" b="0" i="1" smtClean="0">
-                              <a:latin typeface="Cambria Math"/>
-                              <a:ea typeface="Cambria Math"/>
-                            </a:rPr>
-                            <m:t>𝜃</m:t>
-                          </m:r>
-                          <m:r>
-                            <a:rPr lang="en-US" b="0" i="1" smtClean="0">
-                              <a:latin typeface="Cambria Math"/>
-                              <a:ea typeface="Cambria Math"/>
-                            </a:rPr>
-                            <m:t>)</m:t>
-                          </m:r>
-                        </m:num>
-                        <m:den>
-                          <m:r>
-                            <a:rPr lang="en-US" i="1">
-                              <a:latin typeface="Cambria Math"/>
-                              <a:ea typeface="Cambria Math"/>
-                            </a:rPr>
-                            <m:t>𝑡</m:t>
-                          </m:r>
-                        </m:den>
-                      </m:f>
-                      <m:r>
-                        <a:rPr lang="en-US" i="1">
-                          <a:latin typeface="Cambria Math"/>
-                          <a:ea typeface="Cambria Math"/>
-                        </a:rPr>
-                        <m:t>=</m:t>
-                      </m:r>
-                      <m:r>
                         <a:rPr lang="en-US" b="0" i="1" smtClean="0">
-                          <a:latin typeface="Cambria Math"/>
+                          <a:latin typeface="Cambria Math" panose="02040503050406030204" pitchFamily="18" charset="0"/>
                           <a:ea typeface="Cambria Math"/>
                         </a:rPr>
                         <m:t>(</m:t>
                       </m:r>
+                      <m:sSub>
+                        <m:sSubPr>
+                          <m:ctrlPr>
+                            <a:rPr lang="en-US" i="1" smtClean="0">
+                              <a:latin typeface="Cambria Math" panose="02040503050406030204" pitchFamily="18" charset="0"/>
+                              <a:ea typeface="Cambria Math"/>
+                            </a:rPr>
+                          </m:ctrlPr>
+                        </m:sSubPr>
+                        <m:e>
+                          <m:r>
+                            <a:rPr lang="en-US" b="0" i="1" smtClean="0">
+                              <a:latin typeface="Cambria Math" panose="02040503050406030204" pitchFamily="18" charset="0"/>
+                              <a:ea typeface="Cambria Math"/>
+                            </a:rPr>
+                            <m:t>𝑃</m:t>
+                          </m:r>
+                        </m:e>
+                        <m:sub>
+                          <m:r>
+                            <a:rPr lang="en-US" b="0" i="1" smtClean="0">
+                              <a:latin typeface="Cambria Math" panose="02040503050406030204" pitchFamily="18" charset="0"/>
+                              <a:ea typeface="Cambria Math"/>
+                            </a:rPr>
+                            <m:t>𝑎𝑣𝑒</m:t>
+                          </m:r>
+                        </m:sub>
+                      </m:sSub>
                       <m:r>
                         <a:rPr lang="en-US" b="0" i="1" smtClean="0">
-                          <a:latin typeface="Cambria Math"/>
+                          <a:latin typeface="Cambria Math" panose="02040503050406030204" pitchFamily="18" charset="0"/>
                           <a:ea typeface="Cambria Math"/>
                         </a:rPr>
-                        <m:t>𝑀</m:t>
+                        <m:t>)(</m:t>
                       </m:r>
                       <m:r>
                         <a:rPr lang="en-US" b="0" i="1" smtClean="0">
-                          <a:latin typeface="Cambria Math"/>
+                          <a:latin typeface="Cambria Math" panose="02040503050406030204" pitchFamily="18" charset="0"/>
                           <a:ea typeface="Cambria Math"/>
                         </a:rPr>
-                        <m:t>) (</m:t>
-                      </m:r>
-                      <m:r>
-                        <a:rPr lang="en-US" i="1" smtClean="0">
-                          <a:latin typeface="Cambria Math"/>
-                          <a:ea typeface="Cambria Math"/>
-                        </a:rPr>
-                        <m:t>𝜔</m:t>
+                        <m:t>𝑡</m:t>
                       </m:r>
                       <m:r>
                         <a:rPr lang="en-US" b="0" i="1" smtClean="0">
-                          <a:latin typeface="Cambria Math"/>
+                          <a:latin typeface="Cambria Math" panose="02040503050406030204" pitchFamily="18" charset="0"/>
                           <a:ea typeface="Cambria Math"/>
                         </a:rPr>
-                        <m:t>)</m:t>
-                      </m:r>
-                    </m:oMath>
-                  </m:oMathPara>
-                </a14:m>
-                <a:endParaRPr lang="en-US" dirty="0"/>
-              </a:p>
-              <a:p>
-                <a:r>
-                  <a:rPr lang="en-US" dirty="0"/>
-                  <a:t>For a general system with translation and rotation...</a:t>
-                </a:r>
-              </a:p>
-              <a:p>
-                <a:pPr marL="0" indent="0">
-                  <a:buNone/>
-                </a:pPr>
-                <a14:m>
-                  <m:oMathPara xmlns:m="http://schemas.openxmlformats.org/officeDocument/2006/math">
-                    <m:oMathParaPr>
-                      <m:jc m:val="centerGroup"/>
-                    </m:oMathParaPr>
-                    <m:oMath xmlns:m="http://schemas.openxmlformats.org/officeDocument/2006/math">
-                      <m:r>
-                        <a:rPr lang="en-US" i="1">
-                          <a:latin typeface="Cambria Math"/>
-                          <a:ea typeface="Cambria Math"/>
-                        </a:rPr>
-                        <m:t>𝒫</m:t>
+                        <m:t>)=∆</m:t>
                       </m:r>
                       <m:r>
                         <a:rPr lang="en-US" i="1">
-                          <a:latin typeface="Cambria Math"/>
-                          <a:ea typeface="Cambria Math"/>
+                          <a:latin typeface="Cambria Math" panose="02040503050406030204" pitchFamily="18" charset="0"/>
+                          <a:ea typeface="Cambria Math" panose="02040503050406030204" pitchFamily="18" charset="0"/>
                         </a:rPr>
-                        <m:t>=(</m:t>
+                        <m:t>𝐾𝐸</m:t>
                       </m:r>
                       <m:r>
                         <a:rPr lang="en-US" i="1">
-                          <a:latin typeface="Cambria Math"/>
+                          <a:latin typeface="Cambria Math" panose="02040503050406030204" pitchFamily="18" charset="0"/>
+                          <a:ea typeface="Cambria Math" panose="02040503050406030204" pitchFamily="18" charset="0"/>
                         </a:rPr>
-                        <m:t>𝐹</m:t>
-                      </m:r>
-                      <m:r>
-                        <a:rPr lang="en-US" b="0" i="1" smtClean="0">
-                          <a:latin typeface="Cambria Math"/>
-                        </a:rPr>
-                        <m:t>)</m:t>
+                        <m:t>+∆</m:t>
                       </m:r>
                       <m:r>
                         <a:rPr lang="en-US" i="1">
-                          <a:latin typeface="Cambria Math"/>
+                          <a:latin typeface="Cambria Math" panose="02040503050406030204" pitchFamily="18" charset="0"/>
+                          <a:ea typeface="Cambria Math" panose="02040503050406030204" pitchFamily="18" charset="0"/>
                         </a:rPr>
-                        <m:t>  </m:t>
-                      </m:r>
-                      <m:r>
-                        <a:rPr lang="en-US" b="0" i="1" smtClean="0">
-                          <a:latin typeface="Cambria Math"/>
-                        </a:rPr>
-                        <m:t>(</m:t>
-                      </m:r>
-                      <m:r>
-                        <a:rPr lang="en-US" i="1">
-                          <a:latin typeface="Cambria Math"/>
-                        </a:rPr>
-                        <m:t>𝑣</m:t>
-                      </m:r>
-                      <m:r>
-                        <a:rPr lang="en-US" b="0" i="1" smtClean="0">
-                          <a:latin typeface="Cambria Math"/>
-                        </a:rPr>
-                        <m:t>)</m:t>
-                      </m:r>
-                      <m:r>
-                        <a:rPr lang="en-US" b="0" i="0" smtClean="0">
-                          <a:latin typeface="Cambria Math"/>
-                        </a:rPr>
-                        <m:t>+</m:t>
-                      </m:r>
-                      <m:r>
-                        <a:rPr lang="en-US" b="0" i="1" smtClean="0">
-                          <a:latin typeface="Cambria Math"/>
-                        </a:rPr>
-                        <m:t>(</m:t>
-                      </m:r>
-                      <m:r>
-                        <a:rPr lang="en-US" i="1">
-                          <a:latin typeface="Cambria Math"/>
-                          <a:ea typeface="Cambria Math"/>
-                        </a:rPr>
-                        <m:t>𝑀</m:t>
-                      </m:r>
-                      <m:r>
-                        <a:rPr lang="en-US" b="0" i="1" smtClean="0">
-                          <a:latin typeface="Cambria Math"/>
-                          <a:ea typeface="Cambria Math"/>
-                        </a:rPr>
-                        <m:t>)</m:t>
-                      </m:r>
-                      <m:r>
-                        <a:rPr lang="en-US" i="1">
-                          <a:latin typeface="Cambria Math"/>
-                        </a:rPr>
-                        <m:t> </m:t>
-                      </m:r>
-                      <m:r>
-                        <a:rPr lang="en-US" b="0" i="1" smtClean="0">
-                          <a:latin typeface="Cambria Math"/>
-                        </a:rPr>
-                        <m:t>(</m:t>
-                      </m:r>
-                      <m:r>
-                        <a:rPr lang="en-US" i="1">
-                          <a:latin typeface="Cambria Math"/>
-                          <a:ea typeface="Cambria Math"/>
-                        </a:rPr>
-                        <m:t>𝜔</m:t>
-                      </m:r>
-                      <m:r>
-                        <a:rPr lang="en-US" b="0" i="1" smtClean="0">
-                          <a:latin typeface="Cambria Math"/>
-                          <a:ea typeface="Cambria Math"/>
-                        </a:rPr>
-                        <m:t>) </m:t>
+                        <m:t>𝑃𝐸</m:t>
                       </m:r>
                     </m:oMath>
                   </m:oMathPara>
@@ -6462,10 +6897,10 @@
               </p:nvPr>
             </p:nvSpPr>
             <p:spPr>
-              <a:blipFill rotWithShape="1">
+              <a:blipFill>
                 <a:blip r:embed="rId2"/>
                 <a:stretch>
-                  <a:fillRect l="-1630" t="-2830"/>
+                  <a:fillRect l="-1704" t="-2830"/>
                 </a:stretch>
               </a:blipFill>
             </p:spPr>
@@ -6501,7 +6936,7 @@
           <a:p>
             <a:fld id="{929262FE-7F58-4A1E-8AF3-5A510A86DEBD}" type="slidenum">
               <a:rPr lang="en-US" smtClean="0"/>
-              <a:t>5</a:t>
+              <a:t>6</a:t>
             </a:fld>
             <a:endParaRPr lang="en-US"/>
           </a:p>
@@ -6847,647 +7282,6 @@
 </p:sld>
 </file>
 
-<file path=ppt/slides/slide6.xml><?xml version="1.0" encoding="utf-8"?>
-<p:sld xmlns:a="http://schemas.openxmlformats.org/drawingml/2006/main" xmlns:r="http://schemas.openxmlformats.org/officeDocument/2006/relationships" xmlns:p="http://schemas.openxmlformats.org/presentationml/2006/main">
-  <p:cSld>
-    <p:spTree>
-      <p:nvGrpSpPr>
-        <p:cNvPr id="1" name=""/>
-        <p:cNvGrpSpPr/>
-        <p:nvPr/>
-      </p:nvGrpSpPr>
-      <p:grpSpPr>
-        <a:xfrm>
-          <a:off x="0" y="0"/>
-          <a:ext cx="0" cy="0"/>
-          <a:chOff x="0" y="0"/>
-          <a:chExt cx="0" cy="0"/>
-        </a:xfrm>
-      </p:grpSpPr>
-      <p:sp>
-        <p:nvSpPr>
-          <p:cNvPr id="2" name="Title 1"/>
-          <p:cNvSpPr>
-            <a:spLocks noGrp="1"/>
-          </p:cNvSpPr>
-          <p:nvPr>
-            <p:ph type="title"/>
-          </p:nvPr>
-        </p:nvSpPr>
-        <p:spPr/>
-        <p:txBody>
-          <a:bodyPr/>
-          <a:lstStyle/>
-          <a:p>
-            <a:r>
-              <a:rPr lang="en-US" dirty="0"/>
-              <a:t>Power Units</a:t>
-            </a:r>
-          </a:p>
-        </p:txBody>
-      </p:sp>
-      <mc:AlternateContent xmlns:mc="http://schemas.openxmlformats.org/markup-compatibility/2006" xmlns:a14="http://schemas.microsoft.com/office/drawing/2010/main">
-        <mc:Choice Requires="a14">
-          <p:sp>
-            <p:nvSpPr>
-              <p:cNvPr id="3" name="Content Placeholder 2"/>
-              <p:cNvSpPr>
-                <a:spLocks noGrp="1"/>
-              </p:cNvSpPr>
-              <p:nvPr>
-                <p:ph idx="1"/>
-              </p:nvPr>
-            </p:nvSpPr>
-            <p:spPr/>
-            <p:txBody>
-              <a:bodyPr/>
-              <a:lstStyle/>
-              <a:p>
-                <a:r>
-                  <a:rPr lang="en-US" dirty="0"/>
-                  <a:t>The units of power generally are a unit force times a unit distance per unit time.</a:t>
-                </a:r>
-              </a:p>
-              <a:p>
-                <a:r>
-                  <a:rPr lang="en-US" dirty="0"/>
-                  <a:t>In the metric system...</a:t>
-                </a:r>
-              </a:p>
-              <a:p>
-                <a:pPr marL="457200" lvl="1" indent="0">
-                  <a:buNone/>
-                </a:pPr>
-                <a14:m>
-                  <m:oMathPara xmlns:m="http://schemas.openxmlformats.org/officeDocument/2006/math">
-                    <m:oMathParaPr>
-                      <m:jc m:val="centerGroup"/>
-                    </m:oMathParaPr>
-                    <m:oMath xmlns:m="http://schemas.openxmlformats.org/officeDocument/2006/math">
-                      <m:r>
-                        <a:rPr lang="en-US" b="0" i="1" smtClean="0">
-                          <a:latin typeface="Cambria Math"/>
-                        </a:rPr>
-                        <m:t>𝑊𝑎𝑡𝑡</m:t>
-                      </m:r>
-                      <m:r>
-                        <a:rPr lang="en-US" b="0" i="1" smtClean="0">
-                          <a:latin typeface="Cambria Math"/>
-                        </a:rPr>
-                        <m:t>=</m:t>
-                      </m:r>
-                      <m:r>
-                        <a:rPr lang="en-US" b="0" i="1" smtClean="0">
-                          <a:latin typeface="Cambria Math"/>
-                        </a:rPr>
-                        <m:t>𝑊</m:t>
-                      </m:r>
-                      <m:r>
-                        <a:rPr lang="en-US" b="0" i="1" smtClean="0">
-                          <a:latin typeface="Cambria Math"/>
-                        </a:rPr>
-                        <m:t>=1</m:t>
-                      </m:r>
-                      <m:f>
-                        <m:fPr>
-                          <m:ctrlPr>
-                            <a:rPr lang="en-US" b="0" i="1" smtClean="0">
-                              <a:latin typeface="Cambria Math" panose="02040503050406030204" pitchFamily="18" charset="0"/>
-                            </a:rPr>
-                          </m:ctrlPr>
-                        </m:fPr>
-                        <m:num>
-                          <m:r>
-                            <a:rPr lang="en-US" b="0" i="1" smtClean="0">
-                              <a:latin typeface="Cambria Math"/>
-                            </a:rPr>
-                            <m:t>𝐽</m:t>
-                          </m:r>
-                        </m:num>
-                        <m:den>
-                          <m:r>
-                            <a:rPr lang="en-US" b="0" i="1" smtClean="0">
-                              <a:latin typeface="Cambria Math"/>
-                            </a:rPr>
-                            <m:t>𝑠</m:t>
-                          </m:r>
-                        </m:den>
-                      </m:f>
-                      <m:r>
-                        <a:rPr lang="en-US" b="0" i="1" smtClean="0">
-                          <a:latin typeface="Cambria Math"/>
-                        </a:rPr>
-                        <m:t>=1</m:t>
-                      </m:r>
-                      <m:f>
-                        <m:fPr>
-                          <m:ctrlPr>
-                            <a:rPr lang="en-US" b="0" i="1" smtClean="0">
-                              <a:latin typeface="Cambria Math" panose="02040503050406030204" pitchFamily="18" charset="0"/>
-                            </a:rPr>
-                          </m:ctrlPr>
-                        </m:fPr>
-                        <m:num>
-                          <m:r>
-                            <a:rPr lang="en-US" b="0" i="1" smtClean="0">
-                              <a:latin typeface="Cambria Math"/>
-                            </a:rPr>
-                            <m:t>𝑁𝑚</m:t>
-                          </m:r>
-                        </m:num>
-                        <m:den>
-                          <m:r>
-                            <a:rPr lang="en-US" b="0" i="1" smtClean="0">
-                              <a:latin typeface="Cambria Math"/>
-                            </a:rPr>
-                            <m:t>𝑠</m:t>
-                          </m:r>
-                        </m:den>
-                      </m:f>
-                    </m:oMath>
-                  </m:oMathPara>
-                </a14:m>
-                <a:endParaRPr lang="en-US" dirty="0"/>
-              </a:p>
-              <a:p>
-                <a:r>
-                  <a:rPr lang="en-US" dirty="0"/>
-                  <a:t>In the English system...</a:t>
-                </a:r>
-              </a:p>
-              <a:p>
-                <a:pPr marL="457200" lvl="1" indent="0">
-                  <a:buNone/>
-                </a:pPr>
-                <a14:m>
-                  <m:oMathPara xmlns:m="http://schemas.openxmlformats.org/officeDocument/2006/math">
-                    <m:oMathParaPr>
-                      <m:jc m:val="centerGroup"/>
-                    </m:oMathParaPr>
-                    <m:oMath xmlns:m="http://schemas.openxmlformats.org/officeDocument/2006/math">
-                      <m:r>
-                        <a:rPr lang="en-US" b="0" i="1" smtClean="0">
-                          <a:latin typeface="Cambria Math"/>
-                        </a:rPr>
-                        <m:t>𝐻𝑜𝑟𝑠𝑒𝑝𝑜𝑤𝑒𝑟</m:t>
-                      </m:r>
-                      <m:r>
-                        <a:rPr lang="en-US" i="1">
-                          <a:latin typeface="Cambria Math"/>
-                        </a:rPr>
-                        <m:t>=</m:t>
-                      </m:r>
-                      <m:r>
-                        <a:rPr lang="en-US" b="0" i="1" smtClean="0">
-                          <a:latin typeface="Cambria Math"/>
-                        </a:rPr>
-                        <m:t>h𝑝</m:t>
-                      </m:r>
-                      <m:r>
-                        <a:rPr lang="en-US" i="1">
-                          <a:latin typeface="Cambria Math"/>
-                        </a:rPr>
-                        <m:t>=</m:t>
-                      </m:r>
-                      <m:r>
-                        <a:rPr lang="en-US" b="0" i="1" smtClean="0">
-                          <a:latin typeface="Cambria Math"/>
-                        </a:rPr>
-                        <m:t>550</m:t>
-                      </m:r>
-                      <m:f>
-                        <m:fPr>
-                          <m:ctrlPr>
-                            <a:rPr lang="en-US" i="1">
-                              <a:latin typeface="Cambria Math" panose="02040503050406030204" pitchFamily="18" charset="0"/>
-                            </a:rPr>
-                          </m:ctrlPr>
-                        </m:fPr>
-                        <m:num>
-                          <m:r>
-                            <a:rPr lang="en-US" b="0" i="1" smtClean="0">
-                              <a:latin typeface="Cambria Math"/>
-                            </a:rPr>
-                            <m:t>𝑓𝑡</m:t>
-                          </m:r>
-                          <m:r>
-                            <a:rPr lang="en-US" b="0" i="1" smtClean="0">
-                              <a:latin typeface="Cambria Math"/>
-                            </a:rPr>
-                            <m:t> </m:t>
-                          </m:r>
-                          <m:r>
-                            <a:rPr lang="en-US" b="0" i="1" smtClean="0">
-                              <a:latin typeface="Cambria Math"/>
-                            </a:rPr>
-                            <m:t>𝑙𝑏</m:t>
-                          </m:r>
-                        </m:num>
-                        <m:den>
-                          <m:r>
-                            <a:rPr lang="en-US" i="1">
-                              <a:latin typeface="Cambria Math"/>
-                            </a:rPr>
-                            <m:t>𝑠</m:t>
-                          </m:r>
-                        </m:den>
-                      </m:f>
-                    </m:oMath>
-                  </m:oMathPara>
-                </a14:m>
-                <a:endParaRPr lang="en-US" dirty="0"/>
-              </a:p>
-              <a:p>
-                <a:pPr marL="457200" lvl="1" indent="0">
-                  <a:buNone/>
-                </a:pPr>
-                <a:endParaRPr lang="en-US" dirty="0"/>
-              </a:p>
-              <a:p>
-                <a:pPr marL="457200" lvl="1" indent="0">
-                  <a:buNone/>
-                </a:pPr>
-                <a:endParaRPr lang="en-US" dirty="0"/>
-              </a:p>
-            </p:txBody>
-          </p:sp>
-        </mc:Choice>
-        <mc:Fallback xmlns="">
-          <p:sp>
-            <p:nvSpPr>
-              <p:cNvPr id="3" name="Content Placeholder 2"/>
-              <p:cNvSpPr>
-                <a:spLocks noGrp="1" noRot="1" noChangeAspect="1" noMove="1" noResize="1" noEditPoints="1" noAdjustHandles="1" noChangeArrowheads="1" noChangeShapeType="1" noTextEdit="1"/>
-              </p:cNvSpPr>
-              <p:nvPr>
-                <p:ph idx="1"/>
-              </p:nvPr>
-            </p:nvSpPr>
-            <p:spPr>
-              <a:blipFill rotWithShape="1">
-                <a:blip r:embed="rId2"/>
-                <a:stretch>
-                  <a:fillRect l="-1630" t="-1752"/>
-                </a:stretch>
-              </a:blipFill>
-            </p:spPr>
-            <p:txBody>
-              <a:bodyPr/>
-              <a:lstStyle/>
-              <a:p>
-                <a:r>
-                  <a:rPr lang="en-US">
-                    <a:noFill/>
-                  </a:rPr>
-                  <a:t> </a:t>
-                </a:r>
-              </a:p>
-            </p:txBody>
-          </p:sp>
-        </mc:Fallback>
-      </mc:AlternateContent>
-      <p:sp>
-        <p:nvSpPr>
-          <p:cNvPr id="4" name="Slide Number Placeholder 3"/>
-          <p:cNvSpPr>
-            <a:spLocks noGrp="1"/>
-          </p:cNvSpPr>
-          <p:nvPr>
-            <p:ph type="sldNum" sz="quarter" idx="12"/>
-          </p:nvPr>
-        </p:nvSpPr>
-        <p:spPr/>
-        <p:txBody>
-          <a:bodyPr/>
-          <a:lstStyle/>
-          <a:p>
-            <a:pPr marL="0" marR="0" lvl="0" indent="0" algn="r" defTabSz="914400" rtl="0" eaLnBrk="1" fontAlgn="auto" latinLnBrk="0" hangingPunct="1">
-              <a:lnSpc>
-                <a:spcPct val="100000"/>
-              </a:lnSpc>
-              <a:spcBef>
-                <a:spcPts val="0"/>
-              </a:spcBef>
-              <a:spcAft>
-                <a:spcPts val="0"/>
-              </a:spcAft>
-              <a:buClrTx/>
-              <a:buSzTx/>
-              <a:buFontTx/>
-              <a:buNone/>
-              <a:tabLst/>
-              <a:defRPr/>
-            </a:pPr>
-            <a:fld id="{929262FE-7F58-4A1E-8AF3-5A510A86DEBD}" type="slidenum">
-              <a:rPr kumimoji="0" lang="en-US" sz="1200" b="0" i="0" u="none" strike="noStrike" kern="1200" cap="none" spc="0" normalizeH="0" baseline="0" noProof="0" smtClean="0">
-                <a:ln>
-                  <a:noFill/>
-                </a:ln>
-                <a:solidFill>
-                  <a:srgbClr val="4F81BD">
-                    <a:lumMod val="50000"/>
-                  </a:srgbClr>
-                </a:solidFill>
-                <a:effectLst/>
-                <a:uLnTx/>
-                <a:uFillTx/>
-                <a:latin typeface="Calibri"/>
-                <a:ea typeface="+mn-ea"/>
-                <a:cs typeface="+mn-cs"/>
-              </a:rPr>
-              <a:pPr marL="0" marR="0" lvl="0" indent="0" algn="r" defTabSz="914400" rtl="0" eaLnBrk="1" fontAlgn="auto" latinLnBrk="0" hangingPunct="1">
-                <a:lnSpc>
-                  <a:spcPct val="100000"/>
-                </a:lnSpc>
-                <a:spcBef>
-                  <a:spcPts val="0"/>
-                </a:spcBef>
-                <a:spcAft>
-                  <a:spcPts val="0"/>
-                </a:spcAft>
-                <a:buClrTx/>
-                <a:buSzTx/>
-                <a:buFontTx/>
-                <a:buNone/>
-                <a:tabLst/>
-                <a:defRPr/>
-              </a:pPr>
-              <a:t>6</a:t>
-            </a:fld>
-            <a:endParaRPr kumimoji="0" lang="en-US" sz="1200" b="0" i="0" u="none" strike="noStrike" kern="1200" cap="none" spc="0" normalizeH="0" baseline="0" noProof="0">
-              <a:ln>
-                <a:noFill/>
-              </a:ln>
-              <a:solidFill>
-                <a:srgbClr val="4F81BD">
-                  <a:lumMod val="50000"/>
-                </a:srgbClr>
-              </a:solidFill>
-              <a:effectLst/>
-              <a:uLnTx/>
-              <a:uFillTx/>
-              <a:latin typeface="Calibri"/>
-              <a:ea typeface="+mn-ea"/>
-              <a:cs typeface="+mn-cs"/>
-            </a:endParaRPr>
-          </a:p>
-        </p:txBody>
-      </p:sp>
-    </p:spTree>
-    <p:extLst>
-      <p:ext uri="{BB962C8B-B14F-4D97-AF65-F5344CB8AC3E}">
-        <p14:creationId xmlns:p14="http://schemas.microsoft.com/office/powerpoint/2010/main" val="2594544635"/>
-      </p:ext>
-    </p:extLst>
-  </p:cSld>
-  <p:clrMapOvr>
-    <a:masterClrMapping/>
-  </p:clrMapOvr>
-  <p:timing>
-    <p:tnLst>
-      <p:par>
-        <p:cTn id="1" dur="indefinite" restart="never" nodeType="tmRoot">
-          <p:childTnLst>
-            <p:seq concurrent="1" nextAc="seek">
-              <p:cTn id="2" dur="indefinite" nodeType="mainSeq">
-                <p:childTnLst>
-                  <p:par>
-                    <p:cTn id="3" fill="hold">
-                      <p:stCondLst>
-                        <p:cond delay="indefinite"/>
-                      </p:stCondLst>
-                      <p:childTnLst>
-                        <p:par>
-                          <p:cTn id="4" fill="hold">
-                            <p:stCondLst>
-                              <p:cond delay="0"/>
-                            </p:stCondLst>
-                            <p:childTnLst>
-                              <p:par>
-                                <p:cTn id="5" presetID="1" presetClass="entr" presetSubtype="0" fill="hold" grpId="0" nodeType="clickEffect">
-                                  <p:stCondLst>
-                                    <p:cond delay="0"/>
-                                  </p:stCondLst>
-                                  <p:childTnLst>
-                                    <p:set>
-                                      <p:cBhvr>
-                                        <p:cTn id="6" dur="1" fill="hold">
-                                          <p:stCondLst>
-                                            <p:cond delay="0"/>
-                                          </p:stCondLst>
-                                        </p:cTn>
-                                        <p:tgtEl>
-                                          <p:spTgt spid="3">
-                                            <p:txEl>
-                                              <p:pRg st="0" end="0"/>
-                                            </p:txEl>
-                                          </p:spTgt>
-                                        </p:tgtEl>
-                                        <p:attrNameLst>
-                                          <p:attrName>style.visibility</p:attrName>
-                                        </p:attrNameLst>
-                                      </p:cBhvr>
-                                      <p:to>
-                                        <p:strVal val="visible"/>
-                                      </p:to>
-                                    </p:set>
-                                  </p:childTnLst>
-                                </p:cTn>
-                              </p:par>
-                            </p:childTnLst>
-                          </p:cTn>
-                        </p:par>
-                      </p:childTnLst>
-                    </p:cTn>
-                  </p:par>
-                  <p:par>
-                    <p:cTn id="7" fill="hold">
-                      <p:stCondLst>
-                        <p:cond delay="indefinite"/>
-                      </p:stCondLst>
-                      <p:childTnLst>
-                        <p:par>
-                          <p:cTn id="8" fill="hold">
-                            <p:stCondLst>
-                              <p:cond delay="0"/>
-                            </p:stCondLst>
-                            <p:childTnLst>
-                              <p:par>
-                                <p:cTn id="9" presetID="1" presetClass="entr" presetSubtype="0" fill="hold" grpId="0" nodeType="clickEffect">
-                                  <p:stCondLst>
-                                    <p:cond delay="0"/>
-                                  </p:stCondLst>
-                                  <p:childTnLst>
-                                    <p:set>
-                                      <p:cBhvr>
-                                        <p:cTn id="10" dur="1" fill="hold">
-                                          <p:stCondLst>
-                                            <p:cond delay="0"/>
-                                          </p:stCondLst>
-                                        </p:cTn>
-                                        <p:tgtEl>
-                                          <p:spTgt spid="3">
-                                            <p:txEl>
-                                              <p:pRg st="1" end="1"/>
-                                            </p:txEl>
-                                          </p:spTgt>
-                                        </p:tgtEl>
-                                        <p:attrNameLst>
-                                          <p:attrName>style.visibility</p:attrName>
-                                        </p:attrNameLst>
-                                      </p:cBhvr>
-                                      <p:to>
-                                        <p:strVal val="visible"/>
-                                      </p:to>
-                                    </p:set>
-                                  </p:childTnLst>
-                                </p:cTn>
-                              </p:par>
-                              <p:par>
-                                <p:cTn id="11" presetID="1" presetClass="entr" presetSubtype="0" fill="hold" grpId="0" nodeType="withEffect">
-                                  <p:stCondLst>
-                                    <p:cond delay="0"/>
-                                  </p:stCondLst>
-                                  <p:childTnLst>
-                                    <p:set>
-                                      <p:cBhvr>
-                                        <p:cTn id="12" dur="1" fill="hold">
-                                          <p:stCondLst>
-                                            <p:cond delay="0"/>
-                                          </p:stCondLst>
-                                        </p:cTn>
-                                        <p:tgtEl>
-                                          <p:spTgt spid="3">
-                                            <p:txEl>
-                                              <p:pRg st="2" end="2"/>
-                                            </p:txEl>
-                                          </p:spTgt>
-                                        </p:tgtEl>
-                                        <p:attrNameLst>
-                                          <p:attrName>style.visibility</p:attrName>
-                                        </p:attrNameLst>
-                                      </p:cBhvr>
-                                      <p:to>
-                                        <p:strVal val="visible"/>
-                                      </p:to>
-                                    </p:set>
-                                  </p:childTnLst>
-                                </p:cTn>
-                              </p:par>
-                            </p:childTnLst>
-                          </p:cTn>
-                        </p:par>
-                      </p:childTnLst>
-                    </p:cTn>
-                  </p:par>
-                  <p:par>
-                    <p:cTn id="13" fill="hold">
-                      <p:stCondLst>
-                        <p:cond delay="indefinite"/>
-                      </p:stCondLst>
-                      <p:childTnLst>
-                        <p:par>
-                          <p:cTn id="14" fill="hold">
-                            <p:stCondLst>
-                              <p:cond delay="0"/>
-                            </p:stCondLst>
-                            <p:childTnLst>
-                              <p:par>
-                                <p:cTn id="15" presetID="1" presetClass="entr" presetSubtype="0" fill="hold" grpId="0" nodeType="clickEffect">
-                                  <p:stCondLst>
-                                    <p:cond delay="0"/>
-                                  </p:stCondLst>
-                                  <p:childTnLst>
-                                    <p:set>
-                                      <p:cBhvr>
-                                        <p:cTn id="16" dur="1" fill="hold">
-                                          <p:stCondLst>
-                                            <p:cond delay="0"/>
-                                          </p:stCondLst>
-                                        </p:cTn>
-                                        <p:tgtEl>
-                                          <p:spTgt spid="3">
-                                            <p:txEl>
-                                              <p:pRg st="3" end="3"/>
-                                            </p:txEl>
-                                          </p:spTgt>
-                                        </p:tgtEl>
-                                        <p:attrNameLst>
-                                          <p:attrName>style.visibility</p:attrName>
-                                        </p:attrNameLst>
-                                      </p:cBhvr>
-                                      <p:to>
-                                        <p:strVal val="visible"/>
-                                      </p:to>
-                                    </p:set>
-                                  </p:childTnLst>
-                                </p:cTn>
-                              </p:par>
-                              <p:par>
-                                <p:cTn id="17" presetID="1" presetClass="entr" presetSubtype="0" fill="hold" grpId="0" nodeType="withEffect">
-                                  <p:stCondLst>
-                                    <p:cond delay="0"/>
-                                  </p:stCondLst>
-                                  <p:childTnLst>
-                                    <p:set>
-                                      <p:cBhvr>
-                                        <p:cTn id="18" dur="1" fill="hold">
-                                          <p:stCondLst>
-                                            <p:cond delay="0"/>
-                                          </p:stCondLst>
-                                        </p:cTn>
-                                        <p:tgtEl>
-                                          <p:spTgt spid="3">
-                                            <p:txEl>
-                                              <p:pRg st="4" end="4"/>
-                                            </p:txEl>
-                                          </p:spTgt>
-                                        </p:tgtEl>
-                                        <p:attrNameLst>
-                                          <p:attrName>style.visibility</p:attrName>
-                                        </p:attrNameLst>
-                                      </p:cBhvr>
-                                      <p:to>
-                                        <p:strVal val="visible"/>
-                                      </p:to>
-                                    </p:set>
-                                  </p:childTnLst>
-                                </p:cTn>
-                              </p:par>
-                            </p:childTnLst>
-                          </p:cTn>
-                        </p:par>
-                      </p:childTnLst>
-                    </p:cTn>
-                  </p:par>
-                </p:childTnLst>
-              </p:cTn>
-              <p:prevCondLst>
-                <p:cond evt="onPrev" delay="0">
-                  <p:tgtEl>
-                    <p:sldTgt/>
-                  </p:tgtEl>
-                </p:cond>
-              </p:prevCondLst>
-              <p:nextCondLst>
-                <p:cond evt="onNext" delay="0">
-                  <p:tgtEl>
-                    <p:sldTgt/>
-                  </p:tgtEl>
-                </p:cond>
-              </p:nextCondLst>
-            </p:seq>
-          </p:childTnLst>
-        </p:cTn>
-      </p:par>
-    </p:tnLst>
-    <p:bldLst>
-      <p:bldP spid="3" grpId="0" build="p"/>
-    </p:bldLst>
-  </p:timing>
-</p:sld>
-</file>
-
 <file path=ppt/slides/slide7.xml><?xml version="1.0" encoding="utf-8"?>
 <p:sld xmlns:a="http://schemas.openxmlformats.org/drawingml/2006/main" xmlns:r="http://schemas.openxmlformats.org/officeDocument/2006/relationships" xmlns:p="http://schemas.openxmlformats.org/presentationml/2006/main">
   <p:cSld>
@@ -7574,7 +7368,7 @@
               <a:p>
                 <a:r>
                   <a:rPr lang="en-US" dirty="0"/>
-                  <a:t>Solving a power related problem is still at it’s heart a work and energy problem, and we will therefore use a very similar process</a:t>
+                  <a:t>Solving a power related problem is still at its heart a work and energy problem, and we will therefore use a very similar process</a:t>
                 </a:r>
               </a:p>
               <a:p>
@@ -8255,7 +8049,7 @@
             <a:spLocks noGrp="1"/>
           </p:cNvSpPr>
           <p:nvPr>
-            <p:ph type="title"/>
+            <p:ph type="ctrTitle"/>
           </p:nvPr>
         </p:nvSpPr>
         <p:spPr/>
@@ -8265,244 +8059,19 @@
           <a:p>
             <a:r>
               <a:rPr lang="en-US" dirty="0"/>
-              <a:t>Efficiency</a:t>
+              <a:t>Thanks for Watching</a:t>
             </a:r>
           </a:p>
         </p:txBody>
       </p:sp>
-      <mc:AlternateContent xmlns:mc="http://schemas.openxmlformats.org/markup-compatibility/2006" xmlns:a14="http://schemas.microsoft.com/office/drawing/2010/main">
-        <mc:Choice Requires="a14">
-          <p:sp>
-            <p:nvSpPr>
-              <p:cNvPr id="3" name="Content Placeholder 2"/>
-              <p:cNvSpPr>
-                <a:spLocks noGrp="1"/>
-              </p:cNvSpPr>
-              <p:nvPr>
-                <p:ph idx="1"/>
-              </p:nvPr>
-            </p:nvSpPr>
-            <p:spPr/>
-            <p:txBody>
-              <a:bodyPr/>
-              <a:lstStyle/>
-              <a:p>
-                <a:r>
-                  <a:rPr lang="en-US" dirty="0"/>
-                  <a:t>The efficiency is the percentage of the work or power in that makes it out of a system.</a:t>
-                </a:r>
-              </a:p>
-              <a:p>
-                <a:endParaRPr lang="en-US" dirty="0"/>
-              </a:p>
-              <a:p>
-                <a:pPr marL="0" indent="0">
-                  <a:buNone/>
-                </a:pPr>
-                <a14:m>
-                  <m:oMathPara xmlns:m="http://schemas.openxmlformats.org/officeDocument/2006/math">
-                    <m:oMathParaPr>
-                      <m:jc m:val="centerGroup"/>
-                    </m:oMathParaPr>
-                    <m:oMath xmlns:m="http://schemas.openxmlformats.org/officeDocument/2006/math">
-                      <m:r>
-                        <a:rPr lang="en-US" b="0" i="1" smtClean="0">
-                          <a:latin typeface="Cambria Math" panose="02040503050406030204" pitchFamily="18" charset="0"/>
-                          <a:ea typeface="Cambria Math" panose="02040503050406030204" pitchFamily="18" charset="0"/>
-                        </a:rPr>
-                        <m:t>𝜂</m:t>
-                      </m:r>
-                      <m:r>
-                        <a:rPr lang="en-US" b="0" i="1" smtClean="0">
-                          <a:latin typeface="Cambria Math"/>
-                        </a:rPr>
-                        <m:t>=</m:t>
-                      </m:r>
-                      <m:f>
-                        <m:fPr>
-                          <m:ctrlPr>
-                            <a:rPr lang="en-US" b="0" i="1" smtClean="0">
-                              <a:latin typeface="Cambria Math" panose="02040503050406030204" pitchFamily="18" charset="0"/>
-                            </a:rPr>
-                          </m:ctrlPr>
-                        </m:fPr>
-                        <m:num>
-                          <m:sSub>
-                            <m:sSubPr>
-                              <m:ctrlPr>
-                                <a:rPr lang="en-US" b="0" i="1" smtClean="0">
-                                  <a:latin typeface="Cambria Math" panose="02040503050406030204" pitchFamily="18" charset="0"/>
-                                </a:rPr>
-                              </m:ctrlPr>
-                            </m:sSubPr>
-                            <m:e>
-                              <m:r>
-                                <a:rPr lang="en-US" b="0" i="1" smtClean="0">
-                                  <a:latin typeface="Cambria Math"/>
-                                </a:rPr>
-                                <m:t>𝑊</m:t>
-                              </m:r>
-                            </m:e>
-                            <m:sub>
-                              <m:r>
-                                <a:rPr lang="en-US" b="0" i="1" smtClean="0">
-                                  <a:latin typeface="Cambria Math"/>
-                                </a:rPr>
-                                <m:t>𝑜𝑢𝑡</m:t>
-                              </m:r>
-                            </m:sub>
-                          </m:sSub>
-                        </m:num>
-                        <m:den>
-                          <m:sSub>
-                            <m:sSubPr>
-                              <m:ctrlPr>
-                                <a:rPr lang="en-US" i="1">
-                                  <a:latin typeface="Cambria Math" panose="02040503050406030204" pitchFamily="18" charset="0"/>
-                                </a:rPr>
-                              </m:ctrlPr>
-                            </m:sSubPr>
-                            <m:e>
-                              <m:r>
-                                <a:rPr lang="en-US" i="1">
-                                  <a:latin typeface="Cambria Math"/>
-                                </a:rPr>
-                                <m:t>𝑊</m:t>
-                              </m:r>
-                            </m:e>
-                            <m:sub>
-                              <m:r>
-                                <a:rPr lang="en-US" b="0" i="1" smtClean="0">
-                                  <a:latin typeface="Cambria Math"/>
-                                </a:rPr>
-                                <m:t>𝑖𝑛</m:t>
-                              </m:r>
-                            </m:sub>
-                          </m:sSub>
-                        </m:den>
-                      </m:f>
-                      <m:r>
-                        <a:rPr lang="en-US" b="0" i="1" smtClean="0">
-                          <a:latin typeface="Cambria Math"/>
-                        </a:rPr>
-                        <m:t>=</m:t>
-                      </m:r>
-                      <m:f>
-                        <m:fPr>
-                          <m:ctrlPr>
-                            <a:rPr lang="en-US" b="0" i="1" smtClean="0">
-                              <a:latin typeface="Cambria Math" panose="02040503050406030204" pitchFamily="18" charset="0"/>
-                            </a:rPr>
-                          </m:ctrlPr>
-                        </m:fPr>
-                        <m:num>
-                          <m:sSub>
-                            <m:sSubPr>
-                              <m:ctrlPr>
-                                <a:rPr lang="en-US" b="0" i="1" smtClean="0">
-                                  <a:latin typeface="Cambria Math" panose="02040503050406030204" pitchFamily="18" charset="0"/>
-                                </a:rPr>
-                              </m:ctrlPr>
-                            </m:sSubPr>
-                            <m:e>
-                              <m:r>
-                                <a:rPr lang="en-US" i="1">
-                                  <a:latin typeface="Cambria Math"/>
-                                  <a:ea typeface="Cambria Math"/>
-                                </a:rPr>
-                                <m:t>𝒫</m:t>
-                              </m:r>
-                            </m:e>
-                            <m:sub>
-                              <m:r>
-                                <a:rPr lang="en-US" b="0" i="1" smtClean="0">
-                                  <a:latin typeface="Cambria Math"/>
-                                </a:rPr>
-                                <m:t>𝑜𝑢𝑡</m:t>
-                              </m:r>
-                            </m:sub>
-                          </m:sSub>
-                        </m:num>
-                        <m:den>
-                          <m:sSub>
-                            <m:sSubPr>
-                              <m:ctrlPr>
-                                <a:rPr lang="en-US" i="1">
-                                  <a:latin typeface="Cambria Math" panose="02040503050406030204" pitchFamily="18" charset="0"/>
-                                </a:rPr>
-                              </m:ctrlPr>
-                            </m:sSubPr>
-                            <m:e>
-                              <m:r>
-                                <a:rPr lang="en-US" i="1">
-                                  <a:latin typeface="Cambria Math"/>
-                                  <a:ea typeface="Cambria Math"/>
-                                </a:rPr>
-                                <m:t>𝒫</m:t>
-                              </m:r>
-                            </m:e>
-                            <m:sub>
-                              <m:r>
-                                <a:rPr lang="en-US" b="0" i="1" smtClean="0">
-                                  <a:latin typeface="Cambria Math"/>
-                                  <a:ea typeface="Cambria Math"/>
-                                </a:rPr>
-                                <m:t>𝑖𝑛</m:t>
-                              </m:r>
-                            </m:sub>
-                          </m:sSub>
-                        </m:den>
-                      </m:f>
-                    </m:oMath>
-                  </m:oMathPara>
-                </a14:m>
-                <a:endParaRPr lang="en-US" dirty="0"/>
-              </a:p>
-            </p:txBody>
-          </p:sp>
-        </mc:Choice>
-        <mc:Fallback xmlns="">
-          <p:sp>
-            <p:nvSpPr>
-              <p:cNvPr id="3" name="Content Placeholder 2"/>
-              <p:cNvSpPr>
-                <a:spLocks noGrp="1" noRot="1" noChangeAspect="1" noMove="1" noResize="1" noEditPoints="1" noAdjustHandles="1" noChangeArrowheads="1" noChangeShapeType="1" noTextEdit="1"/>
-              </p:cNvSpPr>
-              <p:nvPr>
-                <p:ph idx="1"/>
-              </p:nvPr>
-            </p:nvSpPr>
-            <p:spPr>
-              <a:blipFill>
-                <a:blip r:embed="rId2"/>
-                <a:stretch>
-                  <a:fillRect l="-1704" t="-1752" r="-2296"/>
-                </a:stretch>
-              </a:blipFill>
-            </p:spPr>
-            <p:txBody>
-              <a:bodyPr/>
-              <a:lstStyle/>
-              <a:p>
-                <a:r>
-                  <a:rPr lang="en-US">
-                    <a:noFill/>
-                  </a:rPr>
-                  <a:t> </a:t>
-                </a:r>
-              </a:p>
-            </p:txBody>
-          </p:sp>
-        </mc:Fallback>
-      </mc:AlternateContent>
       <p:sp>
         <p:nvSpPr>
-          <p:cNvPr id="4" name="Slide Number Placeholder 3"/>
+          <p:cNvPr id="3" name="Subtitle 2"/>
           <p:cNvSpPr>
             <a:spLocks noGrp="1"/>
           </p:cNvSpPr>
           <p:nvPr>
-            <p:ph type="sldNum" sz="quarter" idx="12"/>
+            <p:ph type="subTitle" idx="1"/>
           </p:nvPr>
         </p:nvSpPr>
         <p:spPr/>
@@ -8510,155 +8079,23 @@
           <a:bodyPr/>
           <a:lstStyle/>
           <a:p>
-            <a:fld id="{929262FE-7F58-4A1E-8AF3-5A510A86DEBD}" type="slidenum">
-              <a:rPr lang="en-US" smtClean="0"/>
-              <a:t>8</a:t>
-            </a:fld>
-            <a:endParaRPr lang="en-US"/>
+            <a:r>
+              <a:rPr lang="en-US" dirty="0"/>
+              <a:t>See other engineering mechanics videos and access the full tool at…</a:t>
+            </a:r>
           </a:p>
         </p:txBody>
       </p:sp>
     </p:spTree>
     <p:extLst>
       <p:ext uri="{BB962C8B-B14F-4D97-AF65-F5344CB8AC3E}">
-        <p14:creationId xmlns:p14="http://schemas.microsoft.com/office/powerpoint/2010/main" val="1604584844"/>
+        <p14:creationId xmlns:p14="http://schemas.microsoft.com/office/powerpoint/2010/main" val="3129637585"/>
       </p:ext>
     </p:extLst>
   </p:cSld>
   <p:clrMapOvr>
     <a:masterClrMapping/>
   </p:clrMapOvr>
-  <p:timing>
-    <p:tnLst>
-      <p:par>
-        <p:cTn id="1" dur="indefinite" restart="never" nodeType="tmRoot">
-          <p:childTnLst>
-            <p:seq concurrent="1" nextAc="seek">
-              <p:cTn id="2" dur="indefinite" nodeType="mainSeq">
-                <p:childTnLst>
-                  <p:par>
-                    <p:cTn id="3" fill="hold">
-                      <p:stCondLst>
-                        <p:cond delay="indefinite"/>
-                      </p:stCondLst>
-                      <p:childTnLst>
-                        <p:par>
-                          <p:cTn id="4" fill="hold">
-                            <p:stCondLst>
-                              <p:cond delay="0"/>
-                            </p:stCondLst>
-                            <p:childTnLst>
-                              <p:par>
-                                <p:cTn id="5" presetID="1" presetClass="entr" presetSubtype="0" fill="hold" grpId="0" nodeType="clickEffect">
-                                  <p:stCondLst>
-                                    <p:cond delay="0"/>
-                                  </p:stCondLst>
-                                  <p:childTnLst>
-                                    <p:set>
-                                      <p:cBhvr>
-                                        <p:cTn id="6" dur="1" fill="hold">
-                                          <p:stCondLst>
-                                            <p:cond delay="0"/>
-                                          </p:stCondLst>
-                                        </p:cTn>
-                                        <p:tgtEl>
-                                          <p:spTgt spid="3">
-                                            <p:txEl>
-                                              <p:pRg st="0" end="0"/>
-                                            </p:txEl>
-                                          </p:spTgt>
-                                        </p:tgtEl>
-                                        <p:attrNameLst>
-                                          <p:attrName>style.visibility</p:attrName>
-                                        </p:attrNameLst>
-                                      </p:cBhvr>
-                                      <p:to>
-                                        <p:strVal val="visible"/>
-                                      </p:to>
-                                    </p:set>
-                                  </p:childTnLst>
-                                </p:cTn>
-                              </p:par>
-                            </p:childTnLst>
-                          </p:cTn>
-                        </p:par>
-                      </p:childTnLst>
-                    </p:cTn>
-                  </p:par>
-                  <p:par>
-                    <p:cTn id="7" fill="hold">
-                      <p:stCondLst>
-                        <p:cond delay="indefinite"/>
-                      </p:stCondLst>
-                      <p:childTnLst>
-                        <p:par>
-                          <p:cTn id="8" fill="hold">
-                            <p:stCondLst>
-                              <p:cond delay="0"/>
-                            </p:stCondLst>
-                            <p:childTnLst>
-                              <p:par>
-                                <p:cTn id="9" presetID="1" presetClass="entr" presetSubtype="0" fill="hold" grpId="0" nodeType="clickEffect">
-                                  <p:stCondLst>
-                                    <p:cond delay="0"/>
-                                  </p:stCondLst>
-                                  <p:childTnLst>
-                                    <p:set>
-                                      <p:cBhvr>
-                                        <p:cTn id="10" dur="1" fill="hold">
-                                          <p:stCondLst>
-                                            <p:cond delay="0"/>
-                                          </p:stCondLst>
-                                        </p:cTn>
-                                        <p:tgtEl>
-                                          <p:spTgt spid="3">
-                                            <p:txEl>
-                                              <p:pRg st="2" end="2"/>
-                                            </p:txEl>
-                                          </p:spTgt>
-                                        </p:tgtEl>
-                                        <p:attrNameLst>
-                                          <p:attrName>style.visibility</p:attrName>
-                                        </p:attrNameLst>
-                                      </p:cBhvr>
-                                      <p:to>
-                                        <p:strVal val="visible"/>
-                                      </p:to>
-                                    </p:set>
-                                  </p:childTnLst>
-                                </p:cTn>
-                              </p:par>
-                            </p:childTnLst>
-                          </p:cTn>
-                        </p:par>
-                      </p:childTnLst>
-                    </p:cTn>
-                  </p:par>
-                </p:childTnLst>
-              </p:cTn>
-              <p:prevCondLst>
-                <p:cond evt="onPrev" delay="0">
-                  <p:tgtEl>
-                    <p:sldTgt/>
-                  </p:tgtEl>
-                </p:cond>
-              </p:prevCondLst>
-              <p:nextCondLst>
-                <p:cond evt="onNext" delay="0">
-                  <p:tgtEl>
-                    <p:sldTgt/>
-                  </p:tgtEl>
-                </p:cond>
-              </p:nextCondLst>
-            </p:seq>
-          </p:childTnLst>
-        </p:cTn>
-      </p:par>
-    </p:tnLst>
-    <p:bldLst>
-      <p:bldP spid="3" grpId="0" build="p"/>
-    </p:bldLst>
-  </p:timing>
 </p:sld>
 </file>
 
@@ -8686,7 +8123,7 @@
             <a:spLocks noGrp="1"/>
           </p:cNvSpPr>
           <p:nvPr>
-            <p:ph type="ctrTitle"/>
+            <p:ph type="title"/>
           </p:nvPr>
         </p:nvSpPr>
         <p:spPr/>
@@ -8696,19 +8133,46 @@
           <a:p>
             <a:r>
               <a:rPr lang="en-US" dirty="0"/>
-              <a:t>Thanks for Watching</a:t>
+              <a:t>Power Worked Example</a:t>
             </a:r>
           </a:p>
         </p:txBody>
       </p:sp>
       <p:sp>
         <p:nvSpPr>
-          <p:cNvPr id="3" name="Subtitle 2"/>
+          <p:cNvPr id="3" name="Content Placeholder 2"/>
           <p:cNvSpPr>
             <a:spLocks noGrp="1"/>
           </p:cNvSpPr>
           <p:nvPr>
-            <p:ph type="subTitle" idx="1"/>
+            <p:ph idx="1"/>
+          </p:nvPr>
+        </p:nvSpPr>
+        <p:spPr>
+          <a:xfrm>
+            <a:off x="457200" y="1600201"/>
+            <a:ext cx="8229600" cy="1981200"/>
+          </a:xfrm>
+        </p:spPr>
+        <p:txBody>
+          <a:bodyPr/>
+          <a:lstStyle/>
+          <a:p>
+            <a:r>
+              <a:rPr lang="en-US" dirty="0"/>
+              <a:t>If a car delivers an average 100 hp to the road and weighs a total of 1.2 tons, how long will it take to go from 0-60 mph?</a:t>
+            </a:r>
+          </a:p>
+        </p:txBody>
+      </p:sp>
+      <p:sp>
+        <p:nvSpPr>
+          <p:cNvPr id="4" name="Slide Number Placeholder 3"/>
+          <p:cNvSpPr>
+            <a:spLocks noGrp="1"/>
+          </p:cNvSpPr>
+          <p:nvPr>
+            <p:ph type="sldNum" sz="quarter" idx="12"/>
           </p:nvPr>
         </p:nvSpPr>
         <p:spPr/>
@@ -8716,17 +8180,63 @@
           <a:bodyPr/>
           <a:lstStyle/>
           <a:p>
-            <a:r>
-              <a:rPr lang="en-US" dirty="0"/>
-              <a:t>See other engineering mechanics videos and access the full tool at…</a:t>
-            </a:r>
+            <a:fld id="{929262FE-7F58-4A1E-8AF3-5A510A86DEBD}" type="slidenum">
+              <a:rPr lang="en-US" smtClean="0"/>
+              <a:t>9</a:t>
+            </a:fld>
+            <a:endParaRPr lang="en-US"/>
           </a:p>
         </p:txBody>
       </p:sp>
+      <p:pic>
+        <p:nvPicPr>
+          <p:cNvPr id="1026" name="Picture 2" descr="Road, Car, Motion, Vehicle, Auto, Car On Road, Car Road">
+            <a:extLst>
+              <a:ext uri="{FF2B5EF4-FFF2-40B4-BE49-F238E27FC236}">
+                <a16:creationId xmlns:a16="http://schemas.microsoft.com/office/drawing/2014/main" id="{DE1368F6-B63C-4F90-AE20-8EDAF9984C40}"/>
+              </a:ext>
+            </a:extLst>
+          </p:cNvPr>
+          <p:cNvPicPr>
+            <a:picLocks noChangeAspect="1" noChangeArrowheads="1"/>
+          </p:cNvPicPr>
+          <p:nvPr/>
+        </p:nvPicPr>
+        <p:blipFill rotWithShape="1">
+          <a:blip r:embed="rId2">
+            <a:extLst>
+              <a:ext uri="{28A0092B-C50C-407E-A947-70E740481C1C}">
+                <a14:useLocalDpi xmlns:a14="http://schemas.microsoft.com/office/drawing/2010/main" val="0"/>
+              </a:ext>
+            </a:extLst>
+          </a:blip>
+          <a:srcRect t="18881" r="23333" b="17585"/>
+          <a:stretch/>
+        </p:blipFill>
+        <p:spPr bwMode="auto">
+          <a:xfrm>
+            <a:off x="1828800" y="3763964"/>
+            <a:ext cx="5486400" cy="2922104"/>
+          </a:xfrm>
+          <a:prstGeom prst="rect">
+            <a:avLst/>
+          </a:prstGeom>
+          <a:noFill/>
+          <a:extLst>
+            <a:ext uri="{909E8E84-426E-40DD-AFC4-6F175D3DCCD1}">
+              <a14:hiddenFill xmlns:a14="http://schemas.microsoft.com/office/drawing/2010/main">
+                <a:solidFill>
+                  <a:srgbClr val="FFFFFF"/>
+                </a:solidFill>
+              </a14:hiddenFill>
+            </a:ext>
+          </a:extLst>
+        </p:spPr>
+      </p:pic>
     </p:spTree>
     <p:extLst>
       <p:ext uri="{BB962C8B-B14F-4D97-AF65-F5344CB8AC3E}">
-        <p14:creationId xmlns:p14="http://schemas.microsoft.com/office/powerpoint/2010/main" val="3129637585"/>
+        <p14:creationId xmlns:p14="http://schemas.microsoft.com/office/powerpoint/2010/main" val="3439906407"/>
       </p:ext>
     </p:extLst>
   </p:cSld>
@@ -9307,21 +8817,12 @@
 </file>
 
 <file path=customXml/item1.xml><?xml version="1.0" encoding="utf-8"?>
-<?mso-contentType ?>
-<FormTemplates xmlns="http://schemas.microsoft.com/sharepoint/v3/contenttype/forms">
-  <Display>DocumentLibraryForm</Display>
-  <Edit>DocumentLibraryForm</Edit>
-  <New>DocumentLibraryForm</New>
-</FormTemplates>
-</file>
-
-<file path=customXml/item2.xml><?xml version="1.0" encoding="utf-8"?>
 <p:properties xmlns:p="http://schemas.microsoft.com/office/2006/metadata/properties" xmlns:xsi="http://www.w3.org/2001/XMLSchema-instance" xmlns:pc="http://schemas.microsoft.com/office/infopath/2007/PartnerControls">
   <documentManagement/>
 </p:properties>
 </file>
 
-<file path=customXml/item3.xml><?xml version="1.0" encoding="utf-8"?>
+<file path=customXml/item2.xml><?xml version="1.0" encoding="utf-8"?>
 <ct:contentTypeSchema xmlns:ct="http://schemas.microsoft.com/office/2006/metadata/contentType" xmlns:ma="http://schemas.microsoft.com/office/2006/metadata/properties/metaAttributes" ct:_="" ma:_="" ma:contentTypeName="Document" ma:contentTypeID="0x010100A06DF21F5BB2734A800ED30F3F452129" ma:contentTypeVersion="12" ma:contentTypeDescription="Create a new document." ma:contentTypeScope="" ma:versionID="544d96a5fbac5de9d5d902b535c73fb2">
   <xsd:schema xmlns:xsd="http://www.w3.org/2001/XMLSchema" xmlns:xs="http://www.w3.org/2001/XMLSchema" xmlns:p="http://schemas.microsoft.com/office/2006/metadata/properties" xmlns:ns3="90d05cb5-950f-4f68-bc2c-e17794455b92" xmlns:ns4="b4eab9fa-dbb0-4082-8491-8bd54207a265" targetNamespace="http://schemas.microsoft.com/office/2006/metadata/properties" ma:root="true" ma:fieldsID="7a710efc71c2169bf9c05e5a40dddf12" ns3:_="" ns4:_="">
     <xsd:import namespace="90d05cb5-950f-4f68-bc2c-e17794455b92"/>
@@ -9538,15 +9039,16 @@
 </ct:contentTypeSchema>
 </file>
 
-<file path=customXml/itemProps1.xml><?xml version="1.0" encoding="utf-8"?>
-<ds:datastoreItem xmlns:ds="http://schemas.openxmlformats.org/officeDocument/2006/customXml" ds:itemID="{F5CF5F32-56DC-4068-8B04-457CF34A96F3}">
-  <ds:schemaRefs>
-    <ds:schemaRef ds:uri="http://schemas.microsoft.com/sharepoint/v3/contenttype/forms"/>
-  </ds:schemaRefs>
-</ds:datastoreItem>
+<file path=customXml/item3.xml><?xml version="1.0" encoding="utf-8"?>
+<?mso-contentType ?>
+<FormTemplates xmlns="http://schemas.microsoft.com/sharepoint/v3/contenttype/forms">
+  <Display>DocumentLibraryForm</Display>
+  <Edit>DocumentLibraryForm</Edit>
+  <New>DocumentLibraryForm</New>
+</FormTemplates>
 </file>
 
-<file path=customXml/itemProps2.xml><?xml version="1.0" encoding="utf-8"?>
+<file path=customXml/itemProps1.xml><?xml version="1.0" encoding="utf-8"?>
 <ds:datastoreItem xmlns:ds="http://schemas.openxmlformats.org/officeDocument/2006/customXml" ds:itemID="{52EB1464-66D1-425A-BBB5-7A9312BBE9C4}">
   <ds:schemaRefs>
     <ds:schemaRef ds:uri="http://schemas.microsoft.com/office/2006/metadata/properties"/>
@@ -9555,7 +9057,7 @@
 </ds:datastoreItem>
 </file>
 
-<file path=customXml/itemProps3.xml><?xml version="1.0" encoding="utf-8"?>
+<file path=customXml/itemProps2.xml><?xml version="1.0" encoding="utf-8"?>
 <ds:datastoreItem xmlns:ds="http://schemas.openxmlformats.org/officeDocument/2006/customXml" ds:itemID="{A43B8A4B-79FE-4529-931C-D64224FA70E3}">
   <ds:schemaRefs>
     <ds:schemaRef ds:uri="http://schemas.microsoft.com/office/2006/metadata/contentType"/>
@@ -9572,4 +9074,12 @@
     <ds:schemaRef ds:uri="http://schemas.microsoft.com/internal/obd"/>
   </ds:schemaRefs>
 </ds:datastoreItem>
+</file>
+
+<file path=customXml/itemProps3.xml><?xml version="1.0" encoding="utf-8"?>
+<ds:datastoreItem xmlns:ds="http://schemas.openxmlformats.org/officeDocument/2006/customXml" ds:itemID="{F5CF5F32-56DC-4068-8B04-457CF34A96F3}">
+  <ds:schemaRefs>
+    <ds:schemaRef ds:uri="http://schemas.microsoft.com/sharepoint/v3/contenttype/forms"/>
+  </ds:schemaRefs>
+</ds:datastoreItem>
 </file>
</xml_diff>

<commit_message>
Added Multiple Worked Problem Videos
Added Multiple Worked Problem Videos, also some smaller typo fixes
</commit_message>
<xml_diff>
--- a/Lecture Slides/VideoLectureSlides/10.2.pptx
+++ b/Lecture Slides/VideoLectureSlides/10.2.pptx
@@ -5,7 +5,7 @@
     <p:sldMasterId id="2147483660" r:id="rId4"/>
   </p:sldMasterIdLst>
   <p:notesMasterIdLst>
-    <p:notesMasterId r:id="rId16"/>
+    <p:notesMasterId r:id="rId18"/>
   </p:notesMasterIdLst>
   <p:sldIdLst>
     <p:sldId id="256" r:id="rId5"/>
@@ -19,6 +19,8 @@
     <p:sldId id="261" r:id="rId13"/>
     <p:sldId id="262" r:id="rId14"/>
     <p:sldId id="302" r:id="rId15"/>
+    <p:sldId id="305" r:id="rId16"/>
+    <p:sldId id="306" r:id="rId17"/>
   </p:sldIdLst>
   <p:sldSz cx="9144000" cy="6858000" type="screen4x3"/>
   <p:notesSz cx="6858000" cy="9144000"/>
@@ -232,7 +234,7 @@
           <a:p>
             <a:fld id="{1AA1AB63-216F-4D5B-8811-CCB935E98D4A}" type="datetimeFigureOut">
               <a:rPr lang="en-US" smtClean="0"/>
-              <a:t>8/2/2021</a:t>
+              <a:t>2/17/2022</a:t>
             </a:fld>
             <a:endParaRPr lang="en-US" dirty="0"/>
           </a:p>
@@ -4320,6 +4322,905 @@
     <p:extLst>
       <p:ext uri="{BB962C8B-B14F-4D97-AF65-F5344CB8AC3E}">
         <p14:creationId xmlns:p14="http://schemas.microsoft.com/office/powerpoint/2010/main" val="3943206623"/>
+      </p:ext>
+    </p:extLst>
+  </p:cSld>
+  <p:clrMapOvr>
+    <a:masterClrMapping/>
+  </p:clrMapOvr>
+</p:sld>
+</file>
+
+<file path=ppt/slides/slide12.xml><?xml version="1.0" encoding="utf-8"?>
+<p:sld xmlns:a="http://schemas.openxmlformats.org/drawingml/2006/main" xmlns:r="http://schemas.openxmlformats.org/officeDocument/2006/relationships" xmlns:p="http://schemas.openxmlformats.org/presentationml/2006/main">
+  <p:cSld>
+    <p:spTree>
+      <p:nvGrpSpPr>
+        <p:cNvPr id="1" name=""/>
+        <p:cNvGrpSpPr/>
+        <p:nvPr/>
+      </p:nvGrpSpPr>
+      <p:grpSpPr>
+        <a:xfrm>
+          <a:off x="0" y="0"/>
+          <a:ext cx="0" cy="0"/>
+          <a:chOff x="0" y="0"/>
+          <a:chExt cx="0" cy="0"/>
+        </a:xfrm>
+      </p:grpSpPr>
+      <p:sp>
+        <p:nvSpPr>
+          <p:cNvPr id="2" name="Title 1">
+            <a:extLst>
+              <a:ext uri="{FF2B5EF4-FFF2-40B4-BE49-F238E27FC236}">
+                <a16:creationId xmlns:a16="http://schemas.microsoft.com/office/drawing/2014/main" id="{D3F0B441-41BE-4EB1-B254-CFE70B201EAA}"/>
+              </a:ext>
+            </a:extLst>
+          </p:cNvPr>
+          <p:cNvSpPr>
+            <a:spLocks noGrp="1"/>
+          </p:cNvSpPr>
+          <p:nvPr>
+            <p:ph type="title"/>
+          </p:nvPr>
+        </p:nvSpPr>
+        <p:spPr/>
+        <p:txBody>
+          <a:bodyPr/>
+          <a:lstStyle/>
+          <a:p>
+            <a:r>
+              <a:rPr lang="en-US" dirty="0"/>
+              <a:t>Worked Example</a:t>
+            </a:r>
+          </a:p>
+        </p:txBody>
+      </p:sp>
+      <p:sp>
+        <p:nvSpPr>
+          <p:cNvPr id="3" name="Content Placeholder 2">
+            <a:extLst>
+              <a:ext uri="{FF2B5EF4-FFF2-40B4-BE49-F238E27FC236}">
+                <a16:creationId xmlns:a16="http://schemas.microsoft.com/office/drawing/2014/main" id="{FB1E71EF-79F0-4A14-8F5F-406F4C2F1527}"/>
+              </a:ext>
+            </a:extLst>
+          </p:cNvPr>
+          <p:cNvSpPr>
+            <a:spLocks noGrp="1"/>
+          </p:cNvSpPr>
+          <p:nvPr>
+            <p:ph idx="1"/>
+          </p:nvPr>
+        </p:nvSpPr>
+        <p:spPr>
+          <a:xfrm>
+            <a:off x="457200" y="1600200"/>
+            <a:ext cx="8229600" cy="1981199"/>
+          </a:xfrm>
+        </p:spPr>
+        <p:txBody>
+          <a:bodyPr>
+            <a:normAutofit fontScale="92500" lnSpcReduction="20000"/>
+          </a:bodyPr>
+          <a:lstStyle/>
+          <a:p>
+            <a:r>
+              <a:rPr lang="en-US" dirty="0"/>
+              <a:t>In a hydraulic system, a 6kN force is exerted over a 50 cm stroke length at the input piston. A 950N force is measured at the output over the 300cm stroke length. Based on these measurements, what is the efficiency of the hydraulic system?</a:t>
+            </a:r>
+          </a:p>
+        </p:txBody>
+      </p:sp>
+      <p:sp>
+        <p:nvSpPr>
+          <p:cNvPr id="4" name="Slide Number Placeholder 3">
+            <a:extLst>
+              <a:ext uri="{FF2B5EF4-FFF2-40B4-BE49-F238E27FC236}">
+                <a16:creationId xmlns:a16="http://schemas.microsoft.com/office/drawing/2014/main" id="{9FD9D3D6-05C7-4022-B628-DA69076C8796}"/>
+              </a:ext>
+            </a:extLst>
+          </p:cNvPr>
+          <p:cNvSpPr>
+            <a:spLocks noGrp="1"/>
+          </p:cNvSpPr>
+          <p:nvPr>
+            <p:ph type="sldNum" sz="quarter" idx="12"/>
+          </p:nvPr>
+        </p:nvSpPr>
+        <p:spPr/>
+        <p:txBody>
+          <a:bodyPr/>
+          <a:lstStyle/>
+          <a:p>
+            <a:fld id="{929262FE-7F58-4A1E-8AF3-5A510A86DEBD}" type="slidenum">
+              <a:rPr lang="en-US" smtClean="0"/>
+              <a:t>12</a:t>
+            </a:fld>
+            <a:endParaRPr lang="en-US" dirty="0"/>
+          </a:p>
+        </p:txBody>
+      </p:sp>
+      <p:pic>
+        <p:nvPicPr>
+          <p:cNvPr id="6" name="Picture 5" descr="A picture containing power shovel, sky, transport, outdoor&#10;&#10;Description automatically generated">
+            <a:extLst>
+              <a:ext uri="{FF2B5EF4-FFF2-40B4-BE49-F238E27FC236}">
+                <a16:creationId xmlns:a16="http://schemas.microsoft.com/office/drawing/2014/main" id="{D4560E40-B303-4C6A-AD61-CE89B5BD3D39}"/>
+              </a:ext>
+            </a:extLst>
+          </p:cNvPr>
+          <p:cNvPicPr>
+            <a:picLocks noChangeAspect="1"/>
+          </p:cNvPicPr>
+          <p:nvPr/>
+        </p:nvPicPr>
+        <p:blipFill>
+          <a:blip r:embed="rId2" cstate="print">
+            <a:extLst>
+              <a:ext uri="{28A0092B-C50C-407E-A947-70E740481C1C}">
+                <a14:useLocalDpi xmlns:a14="http://schemas.microsoft.com/office/drawing/2010/main" val="0"/>
+              </a:ext>
+            </a:extLst>
+          </a:blip>
+          <a:stretch>
+            <a:fillRect/>
+          </a:stretch>
+        </p:blipFill>
+        <p:spPr>
+          <a:xfrm>
+            <a:off x="2133600" y="3571874"/>
+            <a:ext cx="4495800" cy="2509284"/>
+          </a:xfrm>
+          <a:prstGeom prst="rect">
+            <a:avLst/>
+          </a:prstGeom>
+        </p:spPr>
+      </p:pic>
+      <p:sp>
+        <p:nvSpPr>
+          <p:cNvPr id="5" name="TextBox 4">
+            <a:extLst>
+              <a:ext uri="{FF2B5EF4-FFF2-40B4-BE49-F238E27FC236}">
+                <a16:creationId xmlns:a16="http://schemas.microsoft.com/office/drawing/2014/main" id="{2315EE9A-E90C-483D-91DB-DAB4300F79D3}"/>
+              </a:ext>
+            </a:extLst>
+          </p:cNvPr>
+          <p:cNvSpPr txBox="1"/>
+          <p:nvPr/>
+        </p:nvSpPr>
+        <p:spPr>
+          <a:xfrm>
+            <a:off x="2819400" y="6214030"/>
+            <a:ext cx="2877775" cy="369332"/>
+          </a:xfrm>
+          <a:prstGeom prst="rect">
+            <a:avLst/>
+          </a:prstGeom>
+          <a:noFill/>
+        </p:spPr>
+        <p:txBody>
+          <a:bodyPr wrap="none" rtlCol="0">
+            <a:spAutoFit/>
+          </a:bodyPr>
+          <a:lstStyle/>
+          <a:p>
+            <a:r>
+              <a:rPr lang="en-US" dirty="0"/>
+              <a:t>Image by Cjp24 CC-BY-SA 3.0</a:t>
+            </a:r>
+          </a:p>
+        </p:txBody>
+      </p:sp>
+    </p:spTree>
+    <p:extLst>
+      <p:ext uri="{BB962C8B-B14F-4D97-AF65-F5344CB8AC3E}">
+        <p14:creationId xmlns:p14="http://schemas.microsoft.com/office/powerpoint/2010/main" val="795982206"/>
+      </p:ext>
+    </p:extLst>
+  </p:cSld>
+  <p:clrMapOvr>
+    <a:masterClrMapping/>
+  </p:clrMapOvr>
+</p:sld>
+</file>
+
+<file path=ppt/slides/slide13.xml><?xml version="1.0" encoding="utf-8"?>
+<p:sld xmlns:a="http://schemas.openxmlformats.org/drawingml/2006/main" xmlns:r="http://schemas.openxmlformats.org/officeDocument/2006/relationships" xmlns:p="http://schemas.openxmlformats.org/presentationml/2006/main">
+  <p:cSld>
+    <p:spTree>
+      <p:nvGrpSpPr>
+        <p:cNvPr id="1" name=""/>
+        <p:cNvGrpSpPr/>
+        <p:nvPr/>
+      </p:nvGrpSpPr>
+      <p:grpSpPr>
+        <a:xfrm>
+          <a:off x="0" y="0"/>
+          <a:ext cx="0" cy="0"/>
+          <a:chOff x="0" y="0"/>
+          <a:chExt cx="0" cy="0"/>
+        </a:xfrm>
+      </p:grpSpPr>
+      <p:sp>
+        <p:nvSpPr>
+          <p:cNvPr id="2" name="Title 1">
+            <a:extLst>
+              <a:ext uri="{FF2B5EF4-FFF2-40B4-BE49-F238E27FC236}">
+                <a16:creationId xmlns:a16="http://schemas.microsoft.com/office/drawing/2014/main" id="{B112AE5B-EB58-4497-9E6C-CE6FC5CD13D9}"/>
+              </a:ext>
+            </a:extLst>
+          </p:cNvPr>
+          <p:cNvSpPr>
+            <a:spLocks noGrp="1"/>
+          </p:cNvSpPr>
+          <p:nvPr>
+            <p:ph type="title"/>
+          </p:nvPr>
+        </p:nvSpPr>
+        <p:spPr/>
+        <p:txBody>
+          <a:bodyPr/>
+          <a:lstStyle/>
+          <a:p>
+            <a:r>
+              <a:rPr lang="en-US" dirty="0"/>
+              <a:t>Worked Example</a:t>
+            </a:r>
+          </a:p>
+        </p:txBody>
+      </p:sp>
+      <p:sp>
+        <p:nvSpPr>
+          <p:cNvPr id="3" name="Content Placeholder 2">
+            <a:extLst>
+              <a:ext uri="{FF2B5EF4-FFF2-40B4-BE49-F238E27FC236}">
+                <a16:creationId xmlns:a16="http://schemas.microsoft.com/office/drawing/2014/main" id="{B4990617-A4DE-4B34-9D3B-BD4E4458B0BC}"/>
+              </a:ext>
+            </a:extLst>
+          </p:cNvPr>
+          <p:cNvSpPr>
+            <a:spLocks noGrp="1"/>
+          </p:cNvSpPr>
+          <p:nvPr>
+            <p:ph idx="1"/>
+          </p:nvPr>
+        </p:nvSpPr>
+        <p:spPr>
+          <a:xfrm>
+            <a:off x="457200" y="1600202"/>
+            <a:ext cx="8229600" cy="1758432"/>
+          </a:xfrm>
+        </p:spPr>
+        <p:txBody>
+          <a:bodyPr>
+            <a:normAutofit fontScale="85000" lnSpcReduction="20000"/>
+          </a:bodyPr>
+          <a:lstStyle/>
+          <a:p>
+            <a:r>
+              <a:rPr lang="en-US" dirty="0"/>
+              <a:t>A magnetic launch system exerts the force function shown below over its 80cm launch path. Assuming an 80% efficiency, what is the electrical energy we expect to have to put into the system to generate this force function?</a:t>
+            </a:r>
+          </a:p>
+        </p:txBody>
+      </p:sp>
+      <p:sp>
+        <p:nvSpPr>
+          <p:cNvPr id="4" name="Slide Number Placeholder 3">
+            <a:extLst>
+              <a:ext uri="{FF2B5EF4-FFF2-40B4-BE49-F238E27FC236}">
+                <a16:creationId xmlns:a16="http://schemas.microsoft.com/office/drawing/2014/main" id="{C2C5DFB4-3F45-43F3-8C50-6DFCE2582018}"/>
+              </a:ext>
+            </a:extLst>
+          </p:cNvPr>
+          <p:cNvSpPr>
+            <a:spLocks noGrp="1"/>
+          </p:cNvSpPr>
+          <p:nvPr>
+            <p:ph type="sldNum" sz="quarter" idx="12"/>
+          </p:nvPr>
+        </p:nvSpPr>
+        <p:spPr/>
+        <p:txBody>
+          <a:bodyPr/>
+          <a:lstStyle/>
+          <a:p>
+            <a:fld id="{929262FE-7F58-4A1E-8AF3-5A510A86DEBD}" type="slidenum">
+              <a:rPr lang="en-US" smtClean="0"/>
+              <a:t>13</a:t>
+            </a:fld>
+            <a:endParaRPr lang="en-US" dirty="0"/>
+          </a:p>
+        </p:txBody>
+      </p:sp>
+      <p:cxnSp>
+        <p:nvCxnSpPr>
+          <p:cNvPr id="5" name="Straight Arrow Connector 4">
+            <a:extLst>
+              <a:ext uri="{FF2B5EF4-FFF2-40B4-BE49-F238E27FC236}">
+                <a16:creationId xmlns:a16="http://schemas.microsoft.com/office/drawing/2014/main" id="{399EF98A-7065-4FC1-AB56-F9B8A5E02E30}"/>
+              </a:ext>
+            </a:extLst>
+          </p:cNvPr>
+          <p:cNvCxnSpPr/>
+          <p:nvPr/>
+        </p:nvCxnSpPr>
+        <p:spPr>
+          <a:xfrm>
+            <a:off x="1828800" y="6338083"/>
+            <a:ext cx="5791200" cy="0"/>
+          </a:xfrm>
+          <a:prstGeom prst="straightConnector1">
+            <a:avLst/>
+          </a:prstGeom>
+          <a:ln>
+            <a:tailEnd type="arrow"/>
+          </a:ln>
+        </p:spPr>
+        <p:style>
+          <a:lnRef idx="2">
+            <a:schemeClr val="dk1"/>
+          </a:lnRef>
+          <a:fillRef idx="0">
+            <a:schemeClr val="dk1"/>
+          </a:fillRef>
+          <a:effectRef idx="1">
+            <a:schemeClr val="dk1"/>
+          </a:effectRef>
+          <a:fontRef idx="minor">
+            <a:schemeClr val="tx1"/>
+          </a:fontRef>
+        </p:style>
+      </p:cxnSp>
+      <p:cxnSp>
+        <p:nvCxnSpPr>
+          <p:cNvPr id="6" name="Straight Arrow Connector 5">
+            <a:extLst>
+              <a:ext uri="{FF2B5EF4-FFF2-40B4-BE49-F238E27FC236}">
+                <a16:creationId xmlns:a16="http://schemas.microsoft.com/office/drawing/2014/main" id="{261B093A-EF72-43BE-AA54-1128F0B6256E}"/>
+              </a:ext>
+            </a:extLst>
+          </p:cNvPr>
+          <p:cNvCxnSpPr/>
+          <p:nvPr/>
+        </p:nvCxnSpPr>
+        <p:spPr>
+          <a:xfrm flipV="1">
+            <a:off x="1817914" y="3823483"/>
+            <a:ext cx="0" cy="2514600"/>
+          </a:xfrm>
+          <a:prstGeom prst="straightConnector1">
+            <a:avLst/>
+          </a:prstGeom>
+          <a:ln>
+            <a:tailEnd type="arrow"/>
+          </a:ln>
+        </p:spPr>
+        <p:style>
+          <a:lnRef idx="2">
+            <a:schemeClr val="dk1"/>
+          </a:lnRef>
+          <a:fillRef idx="0">
+            <a:schemeClr val="dk1"/>
+          </a:fillRef>
+          <a:effectRef idx="1">
+            <a:schemeClr val="dk1"/>
+          </a:effectRef>
+          <a:fontRef idx="minor">
+            <a:schemeClr val="tx1"/>
+          </a:fontRef>
+        </p:style>
+      </p:cxnSp>
+      <p:cxnSp>
+        <p:nvCxnSpPr>
+          <p:cNvPr id="7" name="Straight Connector 6">
+            <a:extLst>
+              <a:ext uri="{FF2B5EF4-FFF2-40B4-BE49-F238E27FC236}">
+                <a16:creationId xmlns:a16="http://schemas.microsoft.com/office/drawing/2014/main" id="{DD836261-ED78-4F60-A296-DCB20E1FEE2C}"/>
+              </a:ext>
+            </a:extLst>
+          </p:cNvPr>
+          <p:cNvCxnSpPr>
+            <a:cxnSpLocks/>
+          </p:cNvCxnSpPr>
+          <p:nvPr/>
+        </p:nvCxnSpPr>
+        <p:spPr>
+          <a:xfrm>
+            <a:off x="1817914" y="4128283"/>
+            <a:ext cx="4582886" cy="902732"/>
+          </a:xfrm>
+          <a:prstGeom prst="line">
+            <a:avLst/>
+          </a:prstGeom>
+          <a:ln>
+            <a:solidFill>
+              <a:srgbClr val="FF0000"/>
+            </a:solidFill>
+          </a:ln>
+        </p:spPr>
+        <p:style>
+          <a:lnRef idx="3">
+            <a:schemeClr val="dk1"/>
+          </a:lnRef>
+          <a:fillRef idx="0">
+            <a:schemeClr val="dk1"/>
+          </a:fillRef>
+          <a:effectRef idx="2">
+            <a:schemeClr val="dk1"/>
+          </a:effectRef>
+          <a:fontRef idx="minor">
+            <a:schemeClr val="tx1"/>
+          </a:fontRef>
+        </p:style>
+      </p:cxnSp>
+      <p:sp>
+        <p:nvSpPr>
+          <p:cNvPr id="8" name="TextBox 7">
+            <a:extLst>
+              <a:ext uri="{FF2B5EF4-FFF2-40B4-BE49-F238E27FC236}">
+                <a16:creationId xmlns:a16="http://schemas.microsoft.com/office/drawing/2014/main" id="{1666C480-4907-42B1-90E9-6F8DE96584CA}"/>
+              </a:ext>
+            </a:extLst>
+          </p:cNvPr>
+          <p:cNvSpPr txBox="1"/>
+          <p:nvPr/>
+        </p:nvSpPr>
+        <p:spPr>
+          <a:xfrm>
+            <a:off x="7696200" y="6142923"/>
+            <a:ext cx="284052" cy="369332"/>
+          </a:xfrm>
+          <a:prstGeom prst="rect">
+            <a:avLst/>
+          </a:prstGeom>
+          <a:noFill/>
+        </p:spPr>
+        <p:txBody>
+          <a:bodyPr wrap="none" rtlCol="0">
+            <a:spAutoFit/>
+          </a:bodyPr>
+          <a:lstStyle/>
+          <a:p>
+            <a:r>
+              <a:rPr lang="en-US" dirty="0"/>
+              <a:t>x</a:t>
+            </a:r>
+          </a:p>
+        </p:txBody>
+      </p:sp>
+      <mc:AlternateContent xmlns:mc="http://schemas.openxmlformats.org/markup-compatibility/2006">
+        <mc:Choice xmlns:a14="http://schemas.microsoft.com/office/drawing/2010/main" Requires="a14">
+          <p:sp>
+            <p:nvSpPr>
+              <p:cNvPr id="9" name="TextBox 8">
+                <a:extLst>
+                  <a:ext uri="{FF2B5EF4-FFF2-40B4-BE49-F238E27FC236}">
+                    <a16:creationId xmlns:a16="http://schemas.microsoft.com/office/drawing/2014/main" id="{646084CD-E773-4714-B094-FD1AB27D3386}"/>
+                  </a:ext>
+                </a:extLst>
+              </p:cNvPr>
+              <p:cNvSpPr txBox="1"/>
+              <p:nvPr/>
+            </p:nvSpPr>
+            <p:spPr>
+              <a:xfrm>
+                <a:off x="1981200" y="3733800"/>
+                <a:ext cx="1274708" cy="369332"/>
+              </a:xfrm>
+              <a:prstGeom prst="rect">
+                <a:avLst/>
+              </a:prstGeom>
+              <a:noFill/>
+            </p:spPr>
+            <p:txBody>
+              <a:bodyPr wrap="none" rtlCol="0">
+                <a:spAutoFit/>
+              </a:bodyPr>
+              <a:lstStyle/>
+              <a:p>
+                <a:pPr/>
+                <a14:m>
+                  <m:oMathPara xmlns:m="http://schemas.openxmlformats.org/officeDocument/2006/math">
+                    <m:oMathParaPr>
+                      <m:jc m:val="centerGroup"/>
+                    </m:oMathParaPr>
+                    <m:oMath xmlns:m="http://schemas.openxmlformats.org/officeDocument/2006/math">
+                      <m:r>
+                        <a:rPr lang="en-US" b="1" i="1" smtClean="0">
+                          <a:solidFill>
+                            <a:srgbClr val="FF0000"/>
+                          </a:solidFill>
+                          <a:latin typeface="Cambria Math"/>
+                        </a:rPr>
+                        <m:t>𝑭</m:t>
+                      </m:r>
+                      <m:r>
+                        <a:rPr lang="en-US" b="1" i="1" smtClean="0">
+                          <a:solidFill>
+                            <a:srgbClr val="FF0000"/>
+                          </a:solidFill>
+                          <a:latin typeface="Cambria Math"/>
+                        </a:rPr>
+                        <m:t>=</m:t>
+                      </m:r>
+                      <m:r>
+                        <a:rPr lang="en-US" b="1" i="1" smtClean="0">
+                          <a:solidFill>
+                            <a:srgbClr val="FF0000"/>
+                          </a:solidFill>
+                          <a:latin typeface="Cambria Math" panose="02040503050406030204" pitchFamily="18" charset="0"/>
+                        </a:rPr>
+                        <m:t>𝟔𝟎𝟎</m:t>
+                      </m:r>
+                      <m:r>
+                        <a:rPr lang="en-US" b="1" i="1" smtClean="0">
+                          <a:solidFill>
+                            <a:srgbClr val="FF0000"/>
+                          </a:solidFill>
+                          <a:latin typeface="Cambria Math" panose="02040503050406030204" pitchFamily="18" charset="0"/>
+                        </a:rPr>
+                        <m:t>𝑵</m:t>
+                      </m:r>
+                    </m:oMath>
+                  </m:oMathPara>
+                </a14:m>
+                <a:endParaRPr lang="en-US" b="1" dirty="0">
+                  <a:solidFill>
+                    <a:srgbClr val="FF0000"/>
+                  </a:solidFill>
+                </a:endParaRPr>
+              </a:p>
+            </p:txBody>
+          </p:sp>
+        </mc:Choice>
+        <mc:Fallback>
+          <p:sp>
+            <p:nvSpPr>
+              <p:cNvPr id="9" name="TextBox 8">
+                <a:extLst>
+                  <a:ext uri="{FF2B5EF4-FFF2-40B4-BE49-F238E27FC236}">
+                    <a16:creationId xmlns:a16="http://schemas.microsoft.com/office/drawing/2014/main" id="{646084CD-E773-4714-B094-FD1AB27D3386}"/>
+                  </a:ext>
+                </a:extLst>
+              </p:cNvPr>
+              <p:cNvSpPr txBox="1">
+                <a:spLocks noRot="1" noChangeAspect="1" noMove="1" noResize="1" noEditPoints="1" noAdjustHandles="1" noChangeArrowheads="1" noChangeShapeType="1" noTextEdit="1"/>
+              </p:cNvSpPr>
+              <p:nvPr/>
+            </p:nvSpPr>
+            <p:spPr>
+              <a:xfrm>
+                <a:off x="1981200" y="3733800"/>
+                <a:ext cx="1274708" cy="369332"/>
+              </a:xfrm>
+              <a:prstGeom prst="rect">
+                <a:avLst/>
+              </a:prstGeom>
+              <a:blipFill>
+                <a:blip r:embed="rId2"/>
+                <a:stretch>
+                  <a:fillRect/>
+                </a:stretch>
+              </a:blipFill>
+            </p:spPr>
+            <p:txBody>
+              <a:bodyPr/>
+              <a:lstStyle/>
+              <a:p>
+                <a:r>
+                  <a:rPr lang="en-US">
+                    <a:noFill/>
+                  </a:rPr>
+                  <a:t> </a:t>
+                </a:r>
+              </a:p>
+            </p:txBody>
+          </p:sp>
+        </mc:Fallback>
+      </mc:AlternateContent>
+      <mc:AlternateContent xmlns:mc="http://schemas.openxmlformats.org/markup-compatibility/2006">
+        <mc:Choice xmlns:a14="http://schemas.microsoft.com/office/drawing/2010/main" Requires="a14">
+          <p:sp>
+            <p:nvSpPr>
+              <p:cNvPr id="10" name="TextBox 9">
+                <a:extLst>
+                  <a:ext uri="{FF2B5EF4-FFF2-40B4-BE49-F238E27FC236}">
+                    <a16:creationId xmlns:a16="http://schemas.microsoft.com/office/drawing/2014/main" id="{1AD329D9-D3B7-4A51-94CA-EC89399BB909}"/>
+                  </a:ext>
+                </a:extLst>
+              </p:cNvPr>
+              <p:cNvSpPr txBox="1"/>
+              <p:nvPr/>
+            </p:nvSpPr>
+            <p:spPr>
+              <a:xfrm>
+                <a:off x="6400800" y="4901950"/>
+                <a:ext cx="1274708" cy="369332"/>
+              </a:xfrm>
+              <a:prstGeom prst="rect">
+                <a:avLst/>
+              </a:prstGeom>
+              <a:noFill/>
+            </p:spPr>
+            <p:txBody>
+              <a:bodyPr wrap="none" rtlCol="0">
+                <a:spAutoFit/>
+              </a:bodyPr>
+              <a:lstStyle/>
+              <a:p>
+                <a:pPr/>
+                <a14:m>
+                  <m:oMathPara xmlns:m="http://schemas.openxmlformats.org/officeDocument/2006/math">
+                    <m:oMathParaPr>
+                      <m:jc m:val="centerGroup"/>
+                    </m:oMathParaPr>
+                    <m:oMath xmlns:m="http://schemas.openxmlformats.org/officeDocument/2006/math">
+                      <m:r>
+                        <a:rPr lang="en-US" b="1" i="1" smtClean="0">
+                          <a:solidFill>
+                            <a:srgbClr val="FF0000"/>
+                          </a:solidFill>
+                          <a:latin typeface="Cambria Math"/>
+                        </a:rPr>
+                        <m:t>𝑭</m:t>
+                      </m:r>
+                      <m:r>
+                        <a:rPr lang="en-US" b="1" i="1" smtClean="0">
+                          <a:solidFill>
+                            <a:srgbClr val="FF0000"/>
+                          </a:solidFill>
+                          <a:latin typeface="Cambria Math"/>
+                        </a:rPr>
+                        <m:t>=</m:t>
+                      </m:r>
+                      <m:r>
+                        <a:rPr lang="en-US" b="1" i="1" smtClean="0">
+                          <a:solidFill>
+                            <a:srgbClr val="FF0000"/>
+                          </a:solidFill>
+                          <a:latin typeface="Cambria Math" panose="02040503050406030204" pitchFamily="18" charset="0"/>
+                        </a:rPr>
+                        <m:t>𝟒𝟎𝟎</m:t>
+                      </m:r>
+                      <m:r>
+                        <a:rPr lang="en-US" b="1" i="1" smtClean="0">
+                          <a:solidFill>
+                            <a:srgbClr val="FF0000"/>
+                          </a:solidFill>
+                          <a:latin typeface="Cambria Math" panose="02040503050406030204" pitchFamily="18" charset="0"/>
+                        </a:rPr>
+                        <m:t>𝑵</m:t>
+                      </m:r>
+                    </m:oMath>
+                  </m:oMathPara>
+                </a14:m>
+                <a:endParaRPr lang="en-US" b="1" dirty="0">
+                  <a:solidFill>
+                    <a:srgbClr val="FF0000"/>
+                  </a:solidFill>
+                </a:endParaRPr>
+              </a:p>
+            </p:txBody>
+          </p:sp>
+        </mc:Choice>
+        <mc:Fallback>
+          <p:sp>
+            <p:nvSpPr>
+              <p:cNvPr id="10" name="TextBox 9">
+                <a:extLst>
+                  <a:ext uri="{FF2B5EF4-FFF2-40B4-BE49-F238E27FC236}">
+                    <a16:creationId xmlns:a16="http://schemas.microsoft.com/office/drawing/2014/main" id="{1AD329D9-D3B7-4A51-94CA-EC89399BB909}"/>
+                  </a:ext>
+                </a:extLst>
+              </p:cNvPr>
+              <p:cNvSpPr txBox="1">
+                <a:spLocks noRot="1" noChangeAspect="1" noMove="1" noResize="1" noEditPoints="1" noAdjustHandles="1" noChangeArrowheads="1" noChangeShapeType="1" noTextEdit="1"/>
+              </p:cNvSpPr>
+              <p:nvPr/>
+            </p:nvSpPr>
+            <p:spPr>
+              <a:xfrm>
+                <a:off x="6400800" y="4901950"/>
+                <a:ext cx="1274708" cy="369332"/>
+              </a:xfrm>
+              <a:prstGeom prst="rect">
+                <a:avLst/>
+              </a:prstGeom>
+              <a:blipFill>
+                <a:blip r:embed="rId3"/>
+                <a:stretch>
+                  <a:fillRect/>
+                </a:stretch>
+              </a:blipFill>
+            </p:spPr>
+            <p:txBody>
+              <a:bodyPr/>
+              <a:lstStyle/>
+              <a:p>
+                <a:r>
+                  <a:rPr lang="en-US">
+                    <a:noFill/>
+                  </a:rPr>
+                  <a:t> </a:t>
+                </a:r>
+              </a:p>
+            </p:txBody>
+          </p:sp>
+        </mc:Fallback>
+      </mc:AlternateContent>
+      <mc:AlternateContent xmlns:mc="http://schemas.openxmlformats.org/markup-compatibility/2006">
+        <mc:Choice xmlns:a14="http://schemas.microsoft.com/office/drawing/2010/main" Requires="a14">
+          <p:sp>
+            <p:nvSpPr>
+              <p:cNvPr id="11" name="TextBox 10">
+                <a:extLst>
+                  <a:ext uri="{FF2B5EF4-FFF2-40B4-BE49-F238E27FC236}">
+                    <a16:creationId xmlns:a16="http://schemas.microsoft.com/office/drawing/2014/main" id="{A4555D6D-BE32-4D5C-990B-3715B0613741}"/>
+                  </a:ext>
+                </a:extLst>
+              </p:cNvPr>
+              <p:cNvSpPr txBox="1"/>
+              <p:nvPr/>
+            </p:nvSpPr>
+            <p:spPr>
+              <a:xfrm>
+                <a:off x="5791200" y="6338083"/>
+                <a:ext cx="1279517" cy="369332"/>
+              </a:xfrm>
+              <a:prstGeom prst="rect">
+                <a:avLst/>
+              </a:prstGeom>
+              <a:noFill/>
+            </p:spPr>
+            <p:txBody>
+              <a:bodyPr wrap="none" rtlCol="0">
+                <a:spAutoFit/>
+              </a:bodyPr>
+              <a:lstStyle/>
+              <a:p>
+                <a:pPr/>
+                <a14:m>
+                  <m:oMathPara xmlns:m="http://schemas.openxmlformats.org/officeDocument/2006/math">
+                    <m:oMathParaPr>
+                      <m:jc m:val="centerGroup"/>
+                    </m:oMathParaPr>
+                    <m:oMath xmlns:m="http://schemas.openxmlformats.org/officeDocument/2006/math">
+                      <m:r>
+                        <a:rPr lang="en-US" b="1" i="1" smtClean="0">
+                          <a:solidFill>
+                            <a:schemeClr val="tx1"/>
+                          </a:solidFill>
+                          <a:latin typeface="Cambria Math"/>
+                        </a:rPr>
+                        <m:t>𝒙</m:t>
+                      </m:r>
+                      <m:r>
+                        <a:rPr lang="en-US" b="1" i="1" smtClean="0">
+                          <a:solidFill>
+                            <a:schemeClr val="tx1"/>
+                          </a:solidFill>
+                          <a:latin typeface="Cambria Math" panose="02040503050406030204" pitchFamily="18" charset="0"/>
+                        </a:rPr>
+                        <m:t>=</m:t>
+                      </m:r>
+                      <m:r>
+                        <a:rPr lang="en-US" b="1" i="1" smtClean="0">
+                          <a:solidFill>
+                            <a:schemeClr val="tx1"/>
+                          </a:solidFill>
+                          <a:latin typeface="Cambria Math" panose="02040503050406030204" pitchFamily="18" charset="0"/>
+                        </a:rPr>
+                        <m:t>𝟖𝟎</m:t>
+                      </m:r>
+                      <m:r>
+                        <a:rPr lang="en-US" b="1" i="1" smtClean="0">
+                          <a:solidFill>
+                            <a:schemeClr val="tx1"/>
+                          </a:solidFill>
+                          <a:latin typeface="Cambria Math" panose="02040503050406030204" pitchFamily="18" charset="0"/>
+                        </a:rPr>
+                        <m:t>𝒄𝒎</m:t>
+                      </m:r>
+                    </m:oMath>
+                  </m:oMathPara>
+                </a14:m>
+                <a:endParaRPr lang="en-US" b="1" dirty="0">
+                  <a:solidFill>
+                    <a:schemeClr val="tx1"/>
+                  </a:solidFill>
+                </a:endParaRPr>
+              </a:p>
+            </p:txBody>
+          </p:sp>
+        </mc:Choice>
+        <mc:Fallback>
+          <p:sp>
+            <p:nvSpPr>
+              <p:cNvPr id="11" name="TextBox 10">
+                <a:extLst>
+                  <a:ext uri="{FF2B5EF4-FFF2-40B4-BE49-F238E27FC236}">
+                    <a16:creationId xmlns:a16="http://schemas.microsoft.com/office/drawing/2014/main" id="{A4555D6D-BE32-4D5C-990B-3715B0613741}"/>
+                  </a:ext>
+                </a:extLst>
+              </p:cNvPr>
+              <p:cNvSpPr txBox="1">
+                <a:spLocks noRot="1" noChangeAspect="1" noMove="1" noResize="1" noEditPoints="1" noAdjustHandles="1" noChangeArrowheads="1" noChangeShapeType="1" noTextEdit="1"/>
+              </p:cNvSpPr>
+              <p:nvPr/>
+            </p:nvSpPr>
+            <p:spPr>
+              <a:xfrm>
+                <a:off x="5791200" y="6338083"/>
+                <a:ext cx="1279517" cy="369332"/>
+              </a:xfrm>
+              <a:prstGeom prst="rect">
+                <a:avLst/>
+              </a:prstGeom>
+              <a:blipFill>
+                <a:blip r:embed="rId4"/>
+                <a:stretch>
+                  <a:fillRect/>
+                </a:stretch>
+              </a:blipFill>
+            </p:spPr>
+            <p:txBody>
+              <a:bodyPr/>
+              <a:lstStyle/>
+              <a:p>
+                <a:r>
+                  <a:rPr lang="en-US">
+                    <a:noFill/>
+                  </a:rPr>
+                  <a:t> </a:t>
+                </a:r>
+              </a:p>
+            </p:txBody>
+          </p:sp>
+        </mc:Fallback>
+      </mc:AlternateContent>
+      <p:cxnSp>
+        <p:nvCxnSpPr>
+          <p:cNvPr id="12" name="Straight Connector 11">
+            <a:extLst>
+              <a:ext uri="{FF2B5EF4-FFF2-40B4-BE49-F238E27FC236}">
+                <a16:creationId xmlns:a16="http://schemas.microsoft.com/office/drawing/2014/main" id="{23B0ECF0-62AB-485F-BCA7-B1DE0948390A}"/>
+              </a:ext>
+            </a:extLst>
+          </p:cNvPr>
+          <p:cNvCxnSpPr>
+            <a:cxnSpLocks/>
+          </p:cNvCxnSpPr>
+          <p:nvPr/>
+        </p:nvCxnSpPr>
+        <p:spPr>
+          <a:xfrm>
+            <a:off x="6400800" y="4579649"/>
+            <a:ext cx="0" cy="1758434"/>
+          </a:xfrm>
+          <a:prstGeom prst="line">
+            <a:avLst/>
+          </a:prstGeom>
+        </p:spPr>
+        <p:style>
+          <a:lnRef idx="1">
+            <a:schemeClr val="dk1"/>
+          </a:lnRef>
+          <a:fillRef idx="0">
+            <a:schemeClr val="dk1"/>
+          </a:fillRef>
+          <a:effectRef idx="0">
+            <a:schemeClr val="dk1"/>
+          </a:effectRef>
+          <a:fontRef idx="minor">
+            <a:schemeClr val="tx1"/>
+          </a:fontRef>
+        </p:style>
+      </p:cxnSp>
+    </p:spTree>
+    <p:extLst>
+      <p:ext uri="{BB962C8B-B14F-4D97-AF65-F5344CB8AC3E}">
+        <p14:creationId xmlns:p14="http://schemas.microsoft.com/office/powerpoint/2010/main" val="3245116427"/>
       </p:ext>
     </p:extLst>
   </p:cSld>
@@ -8817,9 +9718,12 @@
 </file>
 
 <file path=customXml/item1.xml><?xml version="1.0" encoding="utf-8"?>
-<p:properties xmlns:p="http://schemas.microsoft.com/office/2006/metadata/properties" xmlns:xsi="http://www.w3.org/2001/XMLSchema-instance" xmlns:pc="http://schemas.microsoft.com/office/infopath/2007/PartnerControls">
-  <documentManagement/>
-</p:properties>
+<?mso-contentType ?>
+<FormTemplates xmlns="http://schemas.microsoft.com/sharepoint/v3/contenttype/forms">
+  <Display>DocumentLibraryForm</Display>
+  <Edit>DocumentLibraryForm</Edit>
+  <New>DocumentLibraryForm</New>
+</FormTemplates>
 </file>
 
 <file path=customXml/item2.xml><?xml version="1.0" encoding="utf-8"?>
@@ -9040,19 +9944,15 @@
 </file>
 
 <file path=customXml/item3.xml><?xml version="1.0" encoding="utf-8"?>
-<?mso-contentType ?>
-<FormTemplates xmlns="http://schemas.microsoft.com/sharepoint/v3/contenttype/forms">
-  <Display>DocumentLibraryForm</Display>
-  <Edit>DocumentLibraryForm</Edit>
-  <New>DocumentLibraryForm</New>
-</FormTemplates>
+<p:properties xmlns:p="http://schemas.microsoft.com/office/2006/metadata/properties" xmlns:xsi="http://www.w3.org/2001/XMLSchema-instance" xmlns:pc="http://schemas.microsoft.com/office/infopath/2007/PartnerControls">
+  <documentManagement/>
+</p:properties>
 </file>
 
 <file path=customXml/itemProps1.xml><?xml version="1.0" encoding="utf-8"?>
-<ds:datastoreItem xmlns:ds="http://schemas.openxmlformats.org/officeDocument/2006/customXml" ds:itemID="{52EB1464-66D1-425A-BBB5-7A9312BBE9C4}">
+<ds:datastoreItem xmlns:ds="http://schemas.openxmlformats.org/officeDocument/2006/customXml" ds:itemID="{F5CF5F32-56DC-4068-8B04-457CF34A96F3}">
   <ds:schemaRefs>
-    <ds:schemaRef ds:uri="http://schemas.microsoft.com/office/2006/metadata/properties"/>
-    <ds:schemaRef ds:uri="http://schemas.microsoft.com/office/infopath/2007/PartnerControls"/>
+    <ds:schemaRef ds:uri="http://schemas.microsoft.com/sharepoint/v3/contenttype/forms"/>
   </ds:schemaRefs>
 </ds:datastoreItem>
 </file>
@@ -9077,9 +9977,10 @@
 </file>
 
 <file path=customXml/itemProps3.xml><?xml version="1.0" encoding="utf-8"?>
-<ds:datastoreItem xmlns:ds="http://schemas.openxmlformats.org/officeDocument/2006/customXml" ds:itemID="{F5CF5F32-56DC-4068-8B04-457CF34A96F3}">
+<ds:datastoreItem xmlns:ds="http://schemas.openxmlformats.org/officeDocument/2006/customXml" ds:itemID="{52EB1464-66D1-425A-BBB5-7A9312BBE9C4}">
   <ds:schemaRefs>
-    <ds:schemaRef ds:uri="http://schemas.microsoft.com/sharepoint/v3/contenttype/forms"/>
+    <ds:schemaRef ds:uri="http://schemas.microsoft.com/office/2006/metadata/properties"/>
+    <ds:schemaRef ds:uri="http://schemas.microsoft.com/office/infopath/2007/PartnerControls"/>
   </ds:schemaRefs>
 </ds:datastoreItem>
 </file>
</xml_diff>